<commit_message>
Adicionado novos gráficos, alteração do ETL da fact_Colaboradores para melhor usabilidade e alteração de background image
</commit_message>
<xml_diff>
--- a/Background/Background base.pptx
+++ b/Background/Background base.pptx
@@ -3718,7 +3718,7 @@
           <a:p>
             <a:fld id="{FE999017-FBFC-4239-B8D2-FB352F1B889A}" type="datetimeFigureOut">
               <a:rPr lang="pt-BR" smtClean="0"/>
-              <a:t>02/09/2025</a:t>
+              <a:t>03/09/2025</a:t>
             </a:fld>
             <a:endParaRPr lang="pt-BR"/>
           </a:p>
@@ -4116,7 +4116,7 @@
           <a:p>
             <a:fld id="{CF62B505-841C-4C89-B392-8F545B9B6E7F}" type="datetimeFigureOut">
               <a:rPr lang="pt-BR" smtClean="0"/>
-              <a:t>02/09/2025</a:t>
+              <a:t>03/09/2025</a:t>
             </a:fld>
             <a:endParaRPr lang="pt-BR"/>
           </a:p>
@@ -4286,7 +4286,7 @@
           <a:p>
             <a:fld id="{CF62B505-841C-4C89-B392-8F545B9B6E7F}" type="datetimeFigureOut">
               <a:rPr lang="pt-BR" smtClean="0"/>
-              <a:t>02/09/2025</a:t>
+              <a:t>03/09/2025</a:t>
             </a:fld>
             <a:endParaRPr lang="pt-BR"/>
           </a:p>
@@ -4466,7 +4466,7 @@
           <a:p>
             <a:fld id="{CF62B505-841C-4C89-B392-8F545B9B6E7F}" type="datetimeFigureOut">
               <a:rPr lang="pt-BR" smtClean="0"/>
-              <a:t>02/09/2025</a:t>
+              <a:t>03/09/2025</a:t>
             </a:fld>
             <a:endParaRPr lang="pt-BR"/>
           </a:p>
@@ -4636,7 +4636,7 @@
           <a:p>
             <a:fld id="{CF62B505-841C-4C89-B392-8F545B9B6E7F}" type="datetimeFigureOut">
               <a:rPr lang="pt-BR" smtClean="0"/>
-              <a:t>02/09/2025</a:t>
+              <a:t>03/09/2025</a:t>
             </a:fld>
             <a:endParaRPr lang="pt-BR"/>
           </a:p>
@@ -4882,7 +4882,7 @@
           <a:p>
             <a:fld id="{CF62B505-841C-4C89-B392-8F545B9B6E7F}" type="datetimeFigureOut">
               <a:rPr lang="pt-BR" smtClean="0"/>
-              <a:t>02/09/2025</a:t>
+              <a:t>03/09/2025</a:t>
             </a:fld>
             <a:endParaRPr lang="pt-BR"/>
           </a:p>
@@ -5114,7 +5114,7 @@
           <a:p>
             <a:fld id="{CF62B505-841C-4C89-B392-8F545B9B6E7F}" type="datetimeFigureOut">
               <a:rPr lang="pt-BR" smtClean="0"/>
-              <a:t>02/09/2025</a:t>
+              <a:t>03/09/2025</a:t>
             </a:fld>
             <a:endParaRPr lang="pt-BR"/>
           </a:p>
@@ -5481,7 +5481,7 @@
           <a:p>
             <a:fld id="{CF62B505-841C-4C89-B392-8F545B9B6E7F}" type="datetimeFigureOut">
               <a:rPr lang="pt-BR" smtClean="0"/>
-              <a:t>02/09/2025</a:t>
+              <a:t>03/09/2025</a:t>
             </a:fld>
             <a:endParaRPr lang="pt-BR"/>
           </a:p>
@@ -5599,7 +5599,7 @@
           <a:p>
             <a:fld id="{CF62B505-841C-4C89-B392-8F545B9B6E7F}" type="datetimeFigureOut">
               <a:rPr lang="pt-BR" smtClean="0"/>
-              <a:t>02/09/2025</a:t>
+              <a:t>03/09/2025</a:t>
             </a:fld>
             <a:endParaRPr lang="pt-BR"/>
           </a:p>
@@ -5694,7 +5694,7 @@
           <a:p>
             <a:fld id="{CF62B505-841C-4C89-B392-8F545B9B6E7F}" type="datetimeFigureOut">
               <a:rPr lang="pt-BR" smtClean="0"/>
-              <a:t>02/09/2025</a:t>
+              <a:t>03/09/2025</a:t>
             </a:fld>
             <a:endParaRPr lang="pt-BR"/>
           </a:p>
@@ -5971,7 +5971,7 @@
           <a:p>
             <a:fld id="{CF62B505-841C-4C89-B392-8F545B9B6E7F}" type="datetimeFigureOut">
               <a:rPr lang="pt-BR" smtClean="0"/>
-              <a:t>02/09/2025</a:t>
+              <a:t>03/09/2025</a:t>
             </a:fld>
             <a:endParaRPr lang="pt-BR"/>
           </a:p>
@@ -6228,7 +6228,7 @@
           <a:p>
             <a:fld id="{CF62B505-841C-4C89-B392-8F545B9B6E7F}" type="datetimeFigureOut">
               <a:rPr lang="pt-BR" smtClean="0"/>
-              <a:t>02/09/2025</a:t>
+              <a:t>03/09/2025</a:t>
             </a:fld>
             <a:endParaRPr lang="pt-BR"/>
           </a:p>
@@ -6441,7 +6441,7 @@
           <a:p>
             <a:fld id="{CF62B505-841C-4C89-B392-8F545B9B6E7F}" type="datetimeFigureOut">
               <a:rPr lang="pt-BR" smtClean="0"/>
-              <a:t>02/09/2025</a:t>
+              <a:t>03/09/2025</a:t>
             </a:fld>
             <a:endParaRPr lang="pt-BR"/>
           </a:p>
@@ -10005,6 +10005,105 @@
           </p:txBody>
         </p:sp>
       </p:grpSp>
+      <p:grpSp>
+        <p:nvGrpSpPr>
+          <p:cNvPr id="6" name="Agrupar 5">
+            <a:extLst>
+              <a:ext uri="{FF2B5EF4-FFF2-40B4-BE49-F238E27FC236}">
+                <a16:creationId xmlns:a16="http://schemas.microsoft.com/office/drawing/2014/main" id="{1C7D6577-1327-7B56-5D5C-ECA28D7204CA}"/>
+              </a:ext>
+            </a:extLst>
+          </p:cNvPr>
+          <p:cNvGrpSpPr/>
+          <p:nvPr/>
+        </p:nvGrpSpPr>
+        <p:grpSpPr>
+          <a:xfrm>
+            <a:off x="223837" y="2766523"/>
+            <a:ext cx="1483519" cy="1510731"/>
+            <a:chOff x="223837" y="2766523"/>
+            <a:chExt cx="1483519" cy="1510731"/>
+          </a:xfrm>
+          <a:effectLst/>
+        </p:grpSpPr>
+        <p:pic>
+          <p:nvPicPr>
+            <p:cNvPr id="7" name="Imagem 6" descr="Forma&#10;&#10;O conteúdo gerado por IA pode estar incorreto.">
+              <a:extLst>
+                <a:ext uri="{FF2B5EF4-FFF2-40B4-BE49-F238E27FC236}">
+                  <a16:creationId xmlns:a16="http://schemas.microsoft.com/office/drawing/2014/main" id="{0C328D27-94E4-A75B-1C8F-9719899C08E4}"/>
+                </a:ext>
+              </a:extLst>
+            </p:cNvPr>
+            <p:cNvPicPr>
+              <a:picLocks noChangeAspect="1"/>
+            </p:cNvPicPr>
+            <p:nvPr/>
+          </p:nvPicPr>
+          <p:blipFill>
+            <a:blip r:embed="rId4">
+              <a:extLst>
+                <a:ext uri="{28A0092B-C50C-407E-A947-70E740481C1C}">
+                  <a14:useLocalDpi xmlns:a14="http://schemas.microsoft.com/office/drawing/2010/main" val="0"/>
+                </a:ext>
+              </a:extLst>
+            </a:blip>
+            <a:stretch>
+              <a:fillRect/>
+            </a:stretch>
+          </p:blipFill>
+          <p:spPr>
+            <a:xfrm>
+              <a:off x="446601" y="2766523"/>
+              <a:ext cx="1085276" cy="1085276"/>
+            </a:xfrm>
+            <a:prstGeom prst="rect">
+              <a:avLst/>
+            </a:prstGeom>
+          </p:spPr>
+        </p:pic>
+        <p:sp>
+          <p:nvSpPr>
+            <p:cNvPr id="8" name="CaixaDeTexto 7">
+              <a:extLst>
+                <a:ext uri="{FF2B5EF4-FFF2-40B4-BE49-F238E27FC236}">
+                  <a16:creationId xmlns:a16="http://schemas.microsoft.com/office/drawing/2014/main" id="{45D49CEA-CE9B-3945-76BE-5EAC1B52CA31}"/>
+                </a:ext>
+              </a:extLst>
+            </p:cNvPr>
+            <p:cNvSpPr txBox="1"/>
+            <p:nvPr/>
+          </p:nvSpPr>
+          <p:spPr>
+            <a:xfrm>
+              <a:off x="223837" y="3815589"/>
+              <a:ext cx="1483519" cy="461665"/>
+            </a:xfrm>
+            <a:prstGeom prst="rect">
+              <a:avLst/>
+            </a:prstGeom>
+            <a:noFill/>
+          </p:spPr>
+          <p:txBody>
+            <a:bodyPr wrap="square" rtlCol="0">
+              <a:spAutoFit/>
+            </a:bodyPr>
+            <a:lstStyle/>
+            <a:p>
+              <a:pPr algn="ctr"/>
+              <a:r>
+                <a:rPr lang="pt-BR" sz="1200" b="1" dirty="0">
+                  <a:latin typeface="Montserrat" panose="00000500000000000000" pitchFamily="2" charset="0"/>
+                </a:rPr>
+                <a:t>RELAÇÃO DE COLAB.</a:t>
+              </a:r>
+              <a:endParaRPr lang="pt-BR" sz="1100" b="1" dirty="0">
+                <a:latin typeface="Montserrat" panose="00000500000000000000" pitchFamily="2" charset="0"/>
+              </a:endParaRPr>
+            </a:p>
+          </p:txBody>
+        </p:sp>
+      </p:grpSp>
     </p:spTree>
     <p:extLst>
       <p:ext uri="{BB962C8B-B14F-4D97-AF65-F5344CB8AC3E}">
@@ -10278,7 +10377,7 @@
               <a:rPr lang="pt-BR" sz="4400" dirty="0">
                 <a:latin typeface="Montserrat SemiBold" panose="00000700000000000000" pitchFamily="2" charset="0"/>
               </a:rPr>
-              <a:t>QUADRO DE FUNCIONÁRIOS</a:t>
+              <a:t>RELAÇÃO DE COLABORADORES</a:t>
             </a:r>
           </a:p>
         </p:txBody>
@@ -10648,73 +10747,6 @@
       </p:grpSp>
       <p:sp>
         <p:nvSpPr>
-          <p:cNvPr id="2" name="Retângulo: Cantos Arredondados 1">
-            <a:extLst>
-              <a:ext uri="{FF2B5EF4-FFF2-40B4-BE49-F238E27FC236}">
-                <a16:creationId xmlns:a16="http://schemas.microsoft.com/office/drawing/2014/main" id="{3A0302AE-87C1-FF0F-0446-DB45790F3A15}"/>
-              </a:ext>
-            </a:extLst>
-          </p:cNvPr>
-          <p:cNvSpPr/>
-          <p:nvPr/>
-        </p:nvSpPr>
-        <p:spPr>
-          <a:xfrm>
-            <a:off x="2231440" y="1471791"/>
-            <a:ext cx="2749122" cy="1143558"/>
-          </a:xfrm>
-          <a:prstGeom prst="roundRect">
-            <a:avLst>
-              <a:gd name="adj" fmla="val 16306"/>
-            </a:avLst>
-          </a:prstGeom>
-          <a:solidFill>
-            <a:schemeClr val="bg1"/>
-          </a:solidFill>
-          <a:ln>
-            <a:noFill/>
-          </a:ln>
-          <a:effectLst>
-            <a:glow rad="63500">
-              <a:schemeClr val="bg1">
-                <a:lumMod val="75000"/>
-                <a:alpha val="40000"/>
-              </a:schemeClr>
-            </a:glow>
-            <a:outerShdw blurRad="50800" dist="38100" dir="5400000" algn="t" rotWithShape="0">
-              <a:schemeClr val="tx1">
-                <a:alpha val="40000"/>
-              </a:schemeClr>
-            </a:outerShdw>
-          </a:effectLst>
-        </p:spPr>
-        <p:style>
-          <a:lnRef idx="2">
-            <a:schemeClr val="accent1">
-              <a:shade val="50000"/>
-            </a:schemeClr>
-          </a:lnRef>
-          <a:fillRef idx="1">
-            <a:schemeClr val="accent1"/>
-          </a:fillRef>
-          <a:effectRef idx="0">
-            <a:schemeClr val="accent1"/>
-          </a:effectRef>
-          <a:fontRef idx="minor">
-            <a:schemeClr val="lt1"/>
-          </a:fontRef>
-        </p:style>
-        <p:txBody>
-          <a:bodyPr rtlCol="0" anchor="ctr"/>
-          <a:lstStyle/>
-          <a:p>
-            <a:pPr algn="ctr"/>
-            <a:endParaRPr lang="pt-BR" sz="1265"/>
-          </a:p>
-        </p:txBody>
-      </p:sp>
-      <p:sp>
-        <p:nvSpPr>
           <p:cNvPr id="3" name="Retângulo: Cantos Arredondados 2">
             <a:extLst>
               <a:ext uri="{FF2B5EF4-FFF2-40B4-BE49-F238E27FC236}">
@@ -10800,140 +10832,6 @@
           <a:prstGeom prst="roundRect">
             <a:avLst>
               <a:gd name="adj" fmla="val 5591"/>
-            </a:avLst>
-          </a:prstGeom>
-          <a:solidFill>
-            <a:schemeClr val="bg1"/>
-          </a:solidFill>
-          <a:ln>
-            <a:noFill/>
-          </a:ln>
-          <a:effectLst>
-            <a:glow rad="63500">
-              <a:schemeClr val="bg1">
-                <a:lumMod val="75000"/>
-                <a:alpha val="40000"/>
-              </a:schemeClr>
-            </a:glow>
-            <a:outerShdw blurRad="50800" dist="38100" dir="5400000" algn="t" rotWithShape="0">
-              <a:schemeClr val="tx1">
-                <a:alpha val="40000"/>
-              </a:schemeClr>
-            </a:outerShdw>
-          </a:effectLst>
-        </p:spPr>
-        <p:style>
-          <a:lnRef idx="2">
-            <a:schemeClr val="accent1">
-              <a:shade val="50000"/>
-            </a:schemeClr>
-          </a:lnRef>
-          <a:fillRef idx="1">
-            <a:schemeClr val="accent1"/>
-          </a:fillRef>
-          <a:effectRef idx="0">
-            <a:schemeClr val="accent1"/>
-          </a:effectRef>
-          <a:fontRef idx="minor">
-            <a:schemeClr val="lt1"/>
-          </a:fontRef>
-        </p:style>
-        <p:txBody>
-          <a:bodyPr rtlCol="0" anchor="ctr"/>
-          <a:lstStyle/>
-          <a:p>
-            <a:pPr algn="ctr"/>
-            <a:endParaRPr lang="pt-BR" sz="1265"/>
-          </a:p>
-        </p:txBody>
-      </p:sp>
-      <p:sp>
-        <p:nvSpPr>
-          <p:cNvPr id="6" name="Retângulo: Cantos Arredondados 5">
-            <a:extLst>
-              <a:ext uri="{FF2B5EF4-FFF2-40B4-BE49-F238E27FC236}">
-                <a16:creationId xmlns:a16="http://schemas.microsoft.com/office/drawing/2014/main" id="{47BF1010-A229-FEA1-79C3-370244190198}"/>
-              </a:ext>
-            </a:extLst>
-          </p:cNvPr>
-          <p:cNvSpPr/>
-          <p:nvPr/>
-        </p:nvSpPr>
-        <p:spPr>
-          <a:xfrm>
-            <a:off x="5559857" y="1471790"/>
-            <a:ext cx="3851803" cy="1143558"/>
-          </a:xfrm>
-          <a:prstGeom prst="roundRect">
-            <a:avLst>
-              <a:gd name="adj" fmla="val 16306"/>
-            </a:avLst>
-          </a:prstGeom>
-          <a:solidFill>
-            <a:schemeClr val="bg1"/>
-          </a:solidFill>
-          <a:ln>
-            <a:noFill/>
-          </a:ln>
-          <a:effectLst>
-            <a:glow rad="63500">
-              <a:schemeClr val="bg1">
-                <a:lumMod val="75000"/>
-                <a:alpha val="40000"/>
-              </a:schemeClr>
-            </a:glow>
-            <a:outerShdw blurRad="50800" dist="38100" dir="5400000" algn="t" rotWithShape="0">
-              <a:schemeClr val="tx1">
-                <a:alpha val="40000"/>
-              </a:schemeClr>
-            </a:outerShdw>
-          </a:effectLst>
-        </p:spPr>
-        <p:style>
-          <a:lnRef idx="2">
-            <a:schemeClr val="accent1">
-              <a:shade val="50000"/>
-            </a:schemeClr>
-          </a:lnRef>
-          <a:fillRef idx="1">
-            <a:schemeClr val="accent1"/>
-          </a:fillRef>
-          <a:effectRef idx="0">
-            <a:schemeClr val="accent1"/>
-          </a:effectRef>
-          <a:fontRef idx="minor">
-            <a:schemeClr val="lt1"/>
-          </a:fontRef>
-        </p:style>
-        <p:txBody>
-          <a:bodyPr rtlCol="0" anchor="ctr"/>
-          <a:lstStyle/>
-          <a:p>
-            <a:pPr algn="ctr"/>
-            <a:endParaRPr lang="pt-BR" sz="1265"/>
-          </a:p>
-        </p:txBody>
-      </p:sp>
-      <p:sp>
-        <p:nvSpPr>
-          <p:cNvPr id="7" name="Retângulo: Cantos Arredondados 6">
-            <a:extLst>
-              <a:ext uri="{FF2B5EF4-FFF2-40B4-BE49-F238E27FC236}">
-                <a16:creationId xmlns:a16="http://schemas.microsoft.com/office/drawing/2014/main" id="{81C102F9-6E18-FE92-7449-119893F8449F}"/>
-              </a:ext>
-            </a:extLst>
-          </p:cNvPr>
-          <p:cNvSpPr/>
-          <p:nvPr/>
-        </p:nvSpPr>
-        <p:spPr>
-          <a:xfrm>
-            <a:off x="9990955" y="1471790"/>
-            <a:ext cx="6390424" cy="1143558"/>
-          </a:xfrm>
-          <a:prstGeom prst="roundRect">
-            <a:avLst>
-              <a:gd name="adj" fmla="val 16306"/>
             </a:avLst>
           </a:prstGeom>
           <a:solidFill>
@@ -11212,7 +11110,7 @@
                 <a:rPr lang="pt-BR" sz="1200" b="1" dirty="0">
                   <a:latin typeface="Montserrat" panose="00000500000000000000" pitchFamily="2" charset="0"/>
                 </a:rPr>
-                <a:t>QUADRO DE FUNCIONÁRIOS</a:t>
+                <a:t>RELAÇÃO DE COLAB.</a:t>
               </a:r>
               <a:endParaRPr lang="pt-BR" sz="1100" b="1" dirty="0">
                 <a:latin typeface="Montserrat" panose="00000500000000000000" pitchFamily="2" charset="0"/>
@@ -11221,120 +11119,636 @@
           </p:txBody>
         </p:sp>
       </p:grpSp>
-      <p:sp>
-        <p:nvSpPr>
-          <p:cNvPr id="15" name="CaixaDeTexto 14">
+      <p:grpSp>
+        <p:nvGrpSpPr>
+          <p:cNvPr id="21" name="Agrupar 20">
             <a:extLst>
               <a:ext uri="{FF2B5EF4-FFF2-40B4-BE49-F238E27FC236}">
-                <a16:creationId xmlns:a16="http://schemas.microsoft.com/office/drawing/2014/main" id="{B83EC193-7005-6804-3005-805A7668EDB1}"/>
+                <a16:creationId xmlns:a16="http://schemas.microsoft.com/office/drawing/2014/main" id="{5B3A8BB8-771B-41AC-EE76-A138660942FD}"/>
               </a:ext>
             </a:extLst>
           </p:cNvPr>
-          <p:cNvSpPr txBox="1"/>
+          <p:cNvGrpSpPr/>
           <p:nvPr/>
-        </p:nvSpPr>
-        <p:spPr>
+        </p:nvGrpSpPr>
+        <p:grpSpPr>
           <a:xfrm>
-            <a:off x="2227660" y="1496945"/>
-            <a:ext cx="2749122" cy="369332"/>
+            <a:off x="2227660" y="1480454"/>
+            <a:ext cx="1916323" cy="1143558"/>
+            <a:chOff x="2227660" y="1471791"/>
+            <a:chExt cx="2752902" cy="1143558"/>
           </a:xfrm>
-          <a:prstGeom prst="rect">
-            <a:avLst/>
-          </a:prstGeom>
-          <a:noFill/>
-        </p:spPr>
-        <p:txBody>
-          <a:bodyPr wrap="square" rtlCol="0">
-            <a:spAutoFit/>
-          </a:bodyPr>
-          <a:lstStyle/>
-          <a:p>
-            <a:pPr algn="ctr"/>
-            <a:r>
-              <a:rPr lang="pt-BR" dirty="0">
-                <a:latin typeface="Montserrat SemiBold" panose="00000700000000000000" pitchFamily="2" charset="0"/>
-              </a:rPr>
-              <a:t>UNIDADE</a:t>
-            </a:r>
-          </a:p>
-        </p:txBody>
-      </p:sp>
-      <p:sp>
-        <p:nvSpPr>
-          <p:cNvPr id="16" name="CaixaDeTexto 15">
+        </p:grpSpPr>
+        <p:sp>
+          <p:nvSpPr>
+            <p:cNvPr id="2" name="Retângulo: Cantos Arredondados 1">
+              <a:extLst>
+                <a:ext uri="{FF2B5EF4-FFF2-40B4-BE49-F238E27FC236}">
+                  <a16:creationId xmlns:a16="http://schemas.microsoft.com/office/drawing/2014/main" id="{3A0302AE-87C1-FF0F-0446-DB45790F3A15}"/>
+                </a:ext>
+              </a:extLst>
+            </p:cNvPr>
+            <p:cNvSpPr/>
+            <p:nvPr/>
+          </p:nvSpPr>
+          <p:spPr>
+            <a:xfrm>
+              <a:off x="2231440" y="1471791"/>
+              <a:ext cx="2749122" cy="1143558"/>
+            </a:xfrm>
+            <a:prstGeom prst="roundRect">
+              <a:avLst>
+                <a:gd name="adj" fmla="val 16306"/>
+              </a:avLst>
+            </a:prstGeom>
+            <a:solidFill>
+              <a:schemeClr val="bg1"/>
+            </a:solidFill>
+            <a:ln>
+              <a:noFill/>
+            </a:ln>
+            <a:effectLst>
+              <a:glow rad="63500">
+                <a:schemeClr val="bg1">
+                  <a:lumMod val="75000"/>
+                  <a:alpha val="40000"/>
+                </a:schemeClr>
+              </a:glow>
+              <a:outerShdw blurRad="50800" dist="38100" dir="5400000" algn="t" rotWithShape="0">
+                <a:schemeClr val="tx1">
+                  <a:alpha val="40000"/>
+                </a:schemeClr>
+              </a:outerShdw>
+            </a:effectLst>
+          </p:spPr>
+          <p:style>
+            <a:lnRef idx="2">
+              <a:schemeClr val="accent1">
+                <a:shade val="50000"/>
+              </a:schemeClr>
+            </a:lnRef>
+            <a:fillRef idx="1">
+              <a:schemeClr val="accent1"/>
+            </a:fillRef>
+            <a:effectRef idx="0">
+              <a:schemeClr val="accent1"/>
+            </a:effectRef>
+            <a:fontRef idx="minor">
+              <a:schemeClr val="lt1"/>
+            </a:fontRef>
+          </p:style>
+          <p:txBody>
+            <a:bodyPr rtlCol="0" anchor="ctr"/>
+            <a:lstStyle/>
+            <a:p>
+              <a:pPr algn="ctr"/>
+              <a:endParaRPr lang="pt-BR" sz="1265"/>
+            </a:p>
+          </p:txBody>
+        </p:sp>
+        <p:sp>
+          <p:nvSpPr>
+            <p:cNvPr id="15" name="CaixaDeTexto 14">
+              <a:extLst>
+                <a:ext uri="{FF2B5EF4-FFF2-40B4-BE49-F238E27FC236}">
+                  <a16:creationId xmlns:a16="http://schemas.microsoft.com/office/drawing/2014/main" id="{B83EC193-7005-6804-3005-805A7668EDB1}"/>
+                </a:ext>
+              </a:extLst>
+            </p:cNvPr>
+            <p:cNvSpPr txBox="1"/>
+            <p:nvPr/>
+          </p:nvSpPr>
+          <p:spPr>
+            <a:xfrm>
+              <a:off x="2227660" y="1496945"/>
+              <a:ext cx="2749122" cy="369332"/>
+            </a:xfrm>
+            <a:prstGeom prst="rect">
+              <a:avLst/>
+            </a:prstGeom>
+            <a:noFill/>
+          </p:spPr>
+          <p:txBody>
+            <a:bodyPr wrap="square" rtlCol="0">
+              <a:spAutoFit/>
+            </a:bodyPr>
+            <a:lstStyle/>
+            <a:p>
+              <a:pPr algn="ctr"/>
+              <a:r>
+                <a:rPr lang="pt-BR" dirty="0">
+                  <a:latin typeface="Montserrat SemiBold" panose="00000700000000000000" pitchFamily="2" charset="0"/>
+                </a:rPr>
+                <a:t>UNIDADE</a:t>
+              </a:r>
+            </a:p>
+          </p:txBody>
+        </p:sp>
+      </p:grpSp>
+      <p:grpSp>
+        <p:nvGrpSpPr>
+          <p:cNvPr id="20" name="Agrupar 19">
             <a:extLst>
               <a:ext uri="{FF2B5EF4-FFF2-40B4-BE49-F238E27FC236}">
-                <a16:creationId xmlns:a16="http://schemas.microsoft.com/office/drawing/2014/main" id="{480AEB56-033E-FF67-C3CE-4FA53ED7968D}"/>
+                <a16:creationId xmlns:a16="http://schemas.microsoft.com/office/drawing/2014/main" id="{AE34B440-990D-EDE3-99E3-B89D8C1AD35D}"/>
               </a:ext>
             </a:extLst>
           </p:cNvPr>
-          <p:cNvSpPr txBox="1"/>
+          <p:cNvGrpSpPr/>
           <p:nvPr/>
-        </p:nvSpPr>
-        <p:spPr>
+        </p:nvGrpSpPr>
+        <p:grpSpPr>
           <a:xfrm>
-            <a:off x="5563636" y="1471789"/>
-            <a:ext cx="3848023" cy="369332"/>
+            <a:off x="4433599" y="1480454"/>
+            <a:ext cx="2660499" cy="1143559"/>
+            <a:chOff x="5559857" y="1471789"/>
+            <a:chExt cx="3851803" cy="1143559"/>
           </a:xfrm>
-          <a:prstGeom prst="rect">
-            <a:avLst/>
-          </a:prstGeom>
-          <a:noFill/>
-        </p:spPr>
-        <p:txBody>
-          <a:bodyPr wrap="square" rtlCol="0">
-            <a:spAutoFit/>
-          </a:bodyPr>
-          <a:lstStyle/>
-          <a:p>
-            <a:pPr algn="ctr"/>
-            <a:r>
-              <a:rPr lang="pt-BR" dirty="0">
-                <a:latin typeface="Montserrat SemiBold" panose="00000700000000000000" pitchFamily="2" charset="0"/>
-              </a:rPr>
-              <a:t>DEPARTAMENTO</a:t>
-            </a:r>
-          </a:p>
-        </p:txBody>
-      </p:sp>
-      <p:sp>
-        <p:nvSpPr>
-          <p:cNvPr id="18" name="CaixaDeTexto 17">
+        </p:grpSpPr>
+        <p:sp>
+          <p:nvSpPr>
+            <p:cNvPr id="6" name="Retângulo: Cantos Arredondados 5">
+              <a:extLst>
+                <a:ext uri="{FF2B5EF4-FFF2-40B4-BE49-F238E27FC236}">
+                  <a16:creationId xmlns:a16="http://schemas.microsoft.com/office/drawing/2014/main" id="{47BF1010-A229-FEA1-79C3-370244190198}"/>
+                </a:ext>
+              </a:extLst>
+            </p:cNvPr>
+            <p:cNvSpPr/>
+            <p:nvPr/>
+          </p:nvSpPr>
+          <p:spPr>
+            <a:xfrm>
+              <a:off x="5559857" y="1471790"/>
+              <a:ext cx="3851803" cy="1143558"/>
+            </a:xfrm>
+            <a:prstGeom prst="roundRect">
+              <a:avLst>
+                <a:gd name="adj" fmla="val 16306"/>
+              </a:avLst>
+            </a:prstGeom>
+            <a:solidFill>
+              <a:schemeClr val="bg1"/>
+            </a:solidFill>
+            <a:ln>
+              <a:noFill/>
+            </a:ln>
+            <a:effectLst>
+              <a:glow rad="63500">
+                <a:schemeClr val="bg1">
+                  <a:lumMod val="75000"/>
+                  <a:alpha val="40000"/>
+                </a:schemeClr>
+              </a:glow>
+              <a:outerShdw blurRad="50800" dist="38100" dir="5400000" algn="t" rotWithShape="0">
+                <a:schemeClr val="tx1">
+                  <a:alpha val="40000"/>
+                </a:schemeClr>
+              </a:outerShdw>
+            </a:effectLst>
+          </p:spPr>
+          <p:style>
+            <a:lnRef idx="2">
+              <a:schemeClr val="accent1">
+                <a:shade val="50000"/>
+              </a:schemeClr>
+            </a:lnRef>
+            <a:fillRef idx="1">
+              <a:schemeClr val="accent1"/>
+            </a:fillRef>
+            <a:effectRef idx="0">
+              <a:schemeClr val="accent1"/>
+            </a:effectRef>
+            <a:fontRef idx="minor">
+              <a:schemeClr val="lt1"/>
+            </a:fontRef>
+          </p:style>
+          <p:txBody>
+            <a:bodyPr rtlCol="0" anchor="ctr"/>
+            <a:lstStyle/>
+            <a:p>
+              <a:pPr algn="ctr"/>
+              <a:endParaRPr lang="pt-BR" sz="1265"/>
+            </a:p>
+          </p:txBody>
+        </p:sp>
+        <p:sp>
+          <p:nvSpPr>
+            <p:cNvPr id="16" name="CaixaDeTexto 15">
+              <a:extLst>
+                <a:ext uri="{FF2B5EF4-FFF2-40B4-BE49-F238E27FC236}">
+                  <a16:creationId xmlns:a16="http://schemas.microsoft.com/office/drawing/2014/main" id="{480AEB56-033E-FF67-C3CE-4FA53ED7968D}"/>
+                </a:ext>
+              </a:extLst>
+            </p:cNvPr>
+            <p:cNvSpPr txBox="1"/>
+            <p:nvPr/>
+          </p:nvSpPr>
+          <p:spPr>
+            <a:xfrm>
+              <a:off x="5563636" y="1471789"/>
+              <a:ext cx="3848023" cy="369332"/>
+            </a:xfrm>
+            <a:prstGeom prst="rect">
+              <a:avLst/>
+            </a:prstGeom>
+            <a:noFill/>
+          </p:spPr>
+          <p:txBody>
+            <a:bodyPr wrap="square" rtlCol="0">
+              <a:spAutoFit/>
+            </a:bodyPr>
+            <a:lstStyle/>
+            <a:p>
+              <a:pPr algn="ctr"/>
+              <a:r>
+                <a:rPr lang="pt-BR" dirty="0">
+                  <a:latin typeface="Montserrat SemiBold" panose="00000700000000000000" pitchFamily="2" charset="0"/>
+                </a:rPr>
+                <a:t>DIRETORIA</a:t>
+              </a:r>
+            </a:p>
+          </p:txBody>
+        </p:sp>
+      </p:grpSp>
+      <p:grpSp>
+        <p:nvGrpSpPr>
+          <p:cNvPr id="11" name="Agrupar 10">
             <a:extLst>
               <a:ext uri="{FF2B5EF4-FFF2-40B4-BE49-F238E27FC236}">
-                <a16:creationId xmlns:a16="http://schemas.microsoft.com/office/drawing/2014/main" id="{E6AD58CB-38FC-3D9E-63C2-3312C006018E}"/>
+                <a16:creationId xmlns:a16="http://schemas.microsoft.com/office/drawing/2014/main" id="{55F422AE-35E3-BE69-C1C8-99F0D20A03DC}"/>
               </a:ext>
             </a:extLst>
           </p:cNvPr>
-          <p:cNvSpPr txBox="1"/>
+          <p:cNvGrpSpPr/>
           <p:nvPr/>
-        </p:nvSpPr>
-        <p:spPr>
+        </p:nvGrpSpPr>
+        <p:grpSpPr>
           <a:xfrm>
-            <a:off x="9990954" y="1496945"/>
-            <a:ext cx="6402307" cy="369332"/>
+            <a:off x="14328885" y="1471789"/>
+            <a:ext cx="6402307" cy="1160889"/>
+            <a:chOff x="9990954" y="1471790"/>
+            <a:chExt cx="6402307" cy="1143558"/>
           </a:xfrm>
-          <a:prstGeom prst="rect">
-            <a:avLst/>
-          </a:prstGeom>
-          <a:noFill/>
-        </p:spPr>
-        <p:txBody>
-          <a:bodyPr wrap="square" rtlCol="0">
-            <a:spAutoFit/>
-          </a:bodyPr>
-          <a:lstStyle/>
-          <a:p>
-            <a:pPr algn="ctr"/>
-            <a:r>
-              <a:rPr lang="pt-BR" dirty="0">
-                <a:latin typeface="Montserrat SemiBold" panose="00000700000000000000" pitchFamily="2" charset="0"/>
-              </a:rPr>
-              <a:t>CENTRO DE CUSTO</a:t>
-            </a:r>
-          </a:p>
-        </p:txBody>
-      </p:sp>
+        </p:grpSpPr>
+        <p:sp>
+          <p:nvSpPr>
+            <p:cNvPr id="7" name="Retângulo: Cantos Arredondados 6">
+              <a:extLst>
+                <a:ext uri="{FF2B5EF4-FFF2-40B4-BE49-F238E27FC236}">
+                  <a16:creationId xmlns:a16="http://schemas.microsoft.com/office/drawing/2014/main" id="{81C102F9-6E18-FE92-7449-119893F8449F}"/>
+                </a:ext>
+              </a:extLst>
+            </p:cNvPr>
+            <p:cNvSpPr/>
+            <p:nvPr/>
+          </p:nvSpPr>
+          <p:spPr>
+            <a:xfrm>
+              <a:off x="9990955" y="1471790"/>
+              <a:ext cx="6390424" cy="1143558"/>
+            </a:xfrm>
+            <a:prstGeom prst="roundRect">
+              <a:avLst>
+                <a:gd name="adj" fmla="val 16306"/>
+              </a:avLst>
+            </a:prstGeom>
+            <a:solidFill>
+              <a:schemeClr val="bg1"/>
+            </a:solidFill>
+            <a:ln>
+              <a:noFill/>
+            </a:ln>
+            <a:effectLst>
+              <a:glow rad="63500">
+                <a:schemeClr val="bg1">
+                  <a:lumMod val="75000"/>
+                  <a:alpha val="40000"/>
+                </a:schemeClr>
+              </a:glow>
+              <a:outerShdw blurRad="50800" dist="38100" dir="5400000" algn="t" rotWithShape="0">
+                <a:schemeClr val="tx1">
+                  <a:alpha val="40000"/>
+                </a:schemeClr>
+              </a:outerShdw>
+            </a:effectLst>
+          </p:spPr>
+          <p:style>
+            <a:lnRef idx="2">
+              <a:schemeClr val="accent1">
+                <a:shade val="50000"/>
+              </a:schemeClr>
+            </a:lnRef>
+            <a:fillRef idx="1">
+              <a:schemeClr val="accent1"/>
+            </a:fillRef>
+            <a:effectRef idx="0">
+              <a:schemeClr val="accent1"/>
+            </a:effectRef>
+            <a:fontRef idx="minor">
+              <a:schemeClr val="lt1"/>
+            </a:fontRef>
+          </p:style>
+          <p:txBody>
+            <a:bodyPr rtlCol="0" anchor="ctr"/>
+            <a:lstStyle/>
+            <a:p>
+              <a:pPr algn="ctr"/>
+              <a:endParaRPr lang="pt-BR" sz="1265"/>
+            </a:p>
+          </p:txBody>
+        </p:sp>
+        <p:sp>
+          <p:nvSpPr>
+            <p:cNvPr id="18" name="CaixaDeTexto 17">
+              <a:extLst>
+                <a:ext uri="{FF2B5EF4-FFF2-40B4-BE49-F238E27FC236}">
+                  <a16:creationId xmlns:a16="http://schemas.microsoft.com/office/drawing/2014/main" id="{E6AD58CB-38FC-3D9E-63C2-3312C006018E}"/>
+                </a:ext>
+              </a:extLst>
+            </p:cNvPr>
+            <p:cNvSpPr txBox="1"/>
+            <p:nvPr/>
+          </p:nvSpPr>
+          <p:spPr>
+            <a:xfrm>
+              <a:off x="9990954" y="1496945"/>
+              <a:ext cx="6402307" cy="369332"/>
+            </a:xfrm>
+            <a:prstGeom prst="rect">
+              <a:avLst/>
+            </a:prstGeom>
+            <a:noFill/>
+          </p:spPr>
+          <p:txBody>
+            <a:bodyPr wrap="square" rtlCol="0">
+              <a:spAutoFit/>
+            </a:bodyPr>
+            <a:lstStyle/>
+            <a:p>
+              <a:pPr algn="ctr"/>
+              <a:r>
+                <a:rPr lang="pt-BR" dirty="0">
+                  <a:latin typeface="Montserrat SemiBold" panose="00000700000000000000" pitchFamily="2" charset="0"/>
+                </a:rPr>
+                <a:t>CENTRO DE CUSTO</a:t>
+              </a:r>
+            </a:p>
+          </p:txBody>
+        </p:sp>
+      </p:grpSp>
+      <p:grpSp>
+        <p:nvGrpSpPr>
+          <p:cNvPr id="22" name="Agrupar 21">
+            <a:extLst>
+              <a:ext uri="{FF2B5EF4-FFF2-40B4-BE49-F238E27FC236}">
+                <a16:creationId xmlns:a16="http://schemas.microsoft.com/office/drawing/2014/main" id="{80035F93-9A9E-59F7-3030-703D58062077}"/>
+              </a:ext>
+            </a:extLst>
+          </p:cNvPr>
+          <p:cNvGrpSpPr/>
+          <p:nvPr/>
+        </p:nvGrpSpPr>
+        <p:grpSpPr>
+          <a:xfrm>
+            <a:off x="7383714" y="1480454"/>
+            <a:ext cx="2727796" cy="1143558"/>
+            <a:chOff x="9990954" y="1471790"/>
+            <a:chExt cx="6402307" cy="1143558"/>
+          </a:xfrm>
+        </p:grpSpPr>
+        <p:sp>
+          <p:nvSpPr>
+            <p:cNvPr id="23" name="Retângulo: Cantos Arredondados 22">
+              <a:extLst>
+                <a:ext uri="{FF2B5EF4-FFF2-40B4-BE49-F238E27FC236}">
+                  <a16:creationId xmlns:a16="http://schemas.microsoft.com/office/drawing/2014/main" id="{B1A49499-7482-58CF-1EB0-6FDDFEF714C7}"/>
+                </a:ext>
+              </a:extLst>
+            </p:cNvPr>
+            <p:cNvSpPr/>
+            <p:nvPr/>
+          </p:nvSpPr>
+          <p:spPr>
+            <a:xfrm>
+              <a:off x="9990955" y="1471790"/>
+              <a:ext cx="6390424" cy="1143558"/>
+            </a:xfrm>
+            <a:prstGeom prst="roundRect">
+              <a:avLst>
+                <a:gd name="adj" fmla="val 16306"/>
+              </a:avLst>
+            </a:prstGeom>
+            <a:solidFill>
+              <a:schemeClr val="bg1"/>
+            </a:solidFill>
+            <a:ln>
+              <a:noFill/>
+            </a:ln>
+            <a:effectLst>
+              <a:glow rad="63500">
+                <a:schemeClr val="bg1">
+                  <a:lumMod val="75000"/>
+                  <a:alpha val="40000"/>
+                </a:schemeClr>
+              </a:glow>
+              <a:outerShdw blurRad="50800" dist="38100" dir="5400000" algn="t" rotWithShape="0">
+                <a:schemeClr val="tx1">
+                  <a:alpha val="40000"/>
+                </a:schemeClr>
+              </a:outerShdw>
+            </a:effectLst>
+          </p:spPr>
+          <p:style>
+            <a:lnRef idx="2">
+              <a:schemeClr val="accent1">
+                <a:shade val="50000"/>
+              </a:schemeClr>
+            </a:lnRef>
+            <a:fillRef idx="1">
+              <a:schemeClr val="accent1"/>
+            </a:fillRef>
+            <a:effectRef idx="0">
+              <a:schemeClr val="accent1"/>
+            </a:effectRef>
+            <a:fontRef idx="minor">
+              <a:schemeClr val="lt1"/>
+            </a:fontRef>
+          </p:style>
+          <p:txBody>
+            <a:bodyPr rtlCol="0" anchor="ctr"/>
+            <a:lstStyle/>
+            <a:p>
+              <a:pPr algn="ctr"/>
+              <a:endParaRPr lang="pt-BR" sz="1265"/>
+            </a:p>
+          </p:txBody>
+        </p:sp>
+        <p:sp>
+          <p:nvSpPr>
+            <p:cNvPr id="24" name="CaixaDeTexto 23">
+              <a:extLst>
+                <a:ext uri="{FF2B5EF4-FFF2-40B4-BE49-F238E27FC236}">
+                  <a16:creationId xmlns:a16="http://schemas.microsoft.com/office/drawing/2014/main" id="{917CA1E5-2F13-8EA9-3FE9-DC9070CCD819}"/>
+                </a:ext>
+              </a:extLst>
+            </p:cNvPr>
+            <p:cNvSpPr txBox="1"/>
+            <p:nvPr/>
+          </p:nvSpPr>
+          <p:spPr>
+            <a:xfrm>
+              <a:off x="9990954" y="1496945"/>
+              <a:ext cx="6402307" cy="369332"/>
+            </a:xfrm>
+            <a:prstGeom prst="rect">
+              <a:avLst/>
+            </a:prstGeom>
+            <a:noFill/>
+          </p:spPr>
+          <p:txBody>
+            <a:bodyPr wrap="square" rtlCol="0">
+              <a:spAutoFit/>
+            </a:bodyPr>
+            <a:lstStyle/>
+            <a:p>
+              <a:pPr algn="ctr"/>
+              <a:r>
+                <a:rPr lang="pt-BR" dirty="0">
+                  <a:latin typeface="Montserrat SemiBold" panose="00000700000000000000" pitchFamily="2" charset="0"/>
+                </a:rPr>
+                <a:t>TIME</a:t>
+              </a:r>
+            </a:p>
+          </p:txBody>
+        </p:sp>
+      </p:grpSp>
+      <p:grpSp>
+        <p:nvGrpSpPr>
+          <p:cNvPr id="25" name="Agrupar 24">
+            <a:extLst>
+              <a:ext uri="{FF2B5EF4-FFF2-40B4-BE49-F238E27FC236}">
+                <a16:creationId xmlns:a16="http://schemas.microsoft.com/office/drawing/2014/main" id="{9F140CD4-D791-89A5-721F-25E1BD0609A9}"/>
+              </a:ext>
+            </a:extLst>
+          </p:cNvPr>
+          <p:cNvGrpSpPr/>
+          <p:nvPr/>
+        </p:nvGrpSpPr>
+        <p:grpSpPr>
+          <a:xfrm>
+            <a:off x="10401126" y="1480454"/>
+            <a:ext cx="3638144" cy="1143558"/>
+            <a:chOff x="9990954" y="1471790"/>
+            <a:chExt cx="6402307" cy="1143558"/>
+          </a:xfrm>
+        </p:grpSpPr>
+        <p:sp>
+          <p:nvSpPr>
+            <p:cNvPr id="26" name="Retângulo: Cantos Arredondados 25">
+              <a:extLst>
+                <a:ext uri="{FF2B5EF4-FFF2-40B4-BE49-F238E27FC236}">
+                  <a16:creationId xmlns:a16="http://schemas.microsoft.com/office/drawing/2014/main" id="{472E6699-3DA1-08A4-C877-FDB7E7DE2AAE}"/>
+                </a:ext>
+              </a:extLst>
+            </p:cNvPr>
+            <p:cNvSpPr/>
+            <p:nvPr/>
+          </p:nvSpPr>
+          <p:spPr>
+            <a:xfrm>
+              <a:off x="9990955" y="1471790"/>
+              <a:ext cx="6390424" cy="1143558"/>
+            </a:xfrm>
+            <a:prstGeom prst="roundRect">
+              <a:avLst>
+                <a:gd name="adj" fmla="val 16306"/>
+              </a:avLst>
+            </a:prstGeom>
+            <a:solidFill>
+              <a:schemeClr val="bg1"/>
+            </a:solidFill>
+            <a:ln>
+              <a:noFill/>
+            </a:ln>
+            <a:effectLst>
+              <a:glow rad="63500">
+                <a:schemeClr val="bg1">
+                  <a:lumMod val="75000"/>
+                  <a:alpha val="40000"/>
+                </a:schemeClr>
+              </a:glow>
+              <a:outerShdw blurRad="50800" dist="38100" dir="5400000" algn="t" rotWithShape="0">
+                <a:schemeClr val="tx1">
+                  <a:alpha val="40000"/>
+                </a:schemeClr>
+              </a:outerShdw>
+            </a:effectLst>
+          </p:spPr>
+          <p:style>
+            <a:lnRef idx="2">
+              <a:schemeClr val="accent1">
+                <a:shade val="50000"/>
+              </a:schemeClr>
+            </a:lnRef>
+            <a:fillRef idx="1">
+              <a:schemeClr val="accent1"/>
+            </a:fillRef>
+            <a:effectRef idx="0">
+              <a:schemeClr val="accent1"/>
+            </a:effectRef>
+            <a:fontRef idx="minor">
+              <a:schemeClr val="lt1"/>
+            </a:fontRef>
+          </p:style>
+          <p:txBody>
+            <a:bodyPr rtlCol="0" anchor="ctr"/>
+            <a:lstStyle/>
+            <a:p>
+              <a:pPr algn="ctr"/>
+              <a:endParaRPr lang="pt-BR" sz="1265"/>
+            </a:p>
+          </p:txBody>
+        </p:sp>
+        <p:sp>
+          <p:nvSpPr>
+            <p:cNvPr id="28" name="CaixaDeTexto 27">
+              <a:extLst>
+                <a:ext uri="{FF2B5EF4-FFF2-40B4-BE49-F238E27FC236}">
+                  <a16:creationId xmlns:a16="http://schemas.microsoft.com/office/drawing/2014/main" id="{F07A18FD-BB73-4F4C-89CE-1332821DA3A4}"/>
+                </a:ext>
+              </a:extLst>
+            </p:cNvPr>
+            <p:cNvSpPr txBox="1"/>
+            <p:nvPr/>
+          </p:nvSpPr>
+          <p:spPr>
+            <a:xfrm>
+              <a:off x="9990954" y="1496945"/>
+              <a:ext cx="6402307" cy="369332"/>
+            </a:xfrm>
+            <a:prstGeom prst="rect">
+              <a:avLst/>
+            </a:prstGeom>
+            <a:noFill/>
+          </p:spPr>
+          <p:txBody>
+            <a:bodyPr wrap="square" rtlCol="0">
+              <a:spAutoFit/>
+            </a:bodyPr>
+            <a:lstStyle/>
+            <a:p>
+              <a:pPr algn="ctr"/>
+              <a:r>
+                <a:rPr lang="pt-BR" dirty="0">
+                  <a:latin typeface="Montserrat SemiBold" panose="00000700000000000000" pitchFamily="2" charset="0"/>
+                </a:rPr>
+                <a:t>SETOR/DEPARTAMENTO</a:t>
+              </a:r>
+            </a:p>
+          </p:txBody>
+        </p:sp>
+      </p:grpSp>
     </p:spTree>
     <p:extLst>
       <p:ext uri="{BB962C8B-B14F-4D97-AF65-F5344CB8AC3E}">

</xml_diff>

<commit_message>
Adicionada nova tabela para Banco de Horas e união das funções dentro da tabela no tratamento dos dados
</commit_message>
<xml_diff>
--- a/Background/Background base.pptx
+++ b/Background/Background base.pptx
@@ -3718,7 +3718,7 @@
           <a:p>
             <a:fld id="{FE999017-FBFC-4239-B8D2-FB352F1B889A}" type="datetimeFigureOut">
               <a:rPr lang="pt-BR" smtClean="0"/>
-              <a:t>03/09/2025</a:t>
+              <a:t>04/09/2025</a:t>
             </a:fld>
             <a:endParaRPr lang="pt-BR"/>
           </a:p>
@@ -4116,7 +4116,7 @@
           <a:p>
             <a:fld id="{CF62B505-841C-4C89-B392-8F545B9B6E7F}" type="datetimeFigureOut">
               <a:rPr lang="pt-BR" smtClean="0"/>
-              <a:t>03/09/2025</a:t>
+              <a:t>04/09/2025</a:t>
             </a:fld>
             <a:endParaRPr lang="pt-BR"/>
           </a:p>
@@ -4286,7 +4286,7 @@
           <a:p>
             <a:fld id="{CF62B505-841C-4C89-B392-8F545B9B6E7F}" type="datetimeFigureOut">
               <a:rPr lang="pt-BR" smtClean="0"/>
-              <a:t>03/09/2025</a:t>
+              <a:t>04/09/2025</a:t>
             </a:fld>
             <a:endParaRPr lang="pt-BR"/>
           </a:p>
@@ -4466,7 +4466,7 @@
           <a:p>
             <a:fld id="{CF62B505-841C-4C89-B392-8F545B9B6E7F}" type="datetimeFigureOut">
               <a:rPr lang="pt-BR" smtClean="0"/>
-              <a:t>03/09/2025</a:t>
+              <a:t>04/09/2025</a:t>
             </a:fld>
             <a:endParaRPr lang="pt-BR"/>
           </a:p>
@@ -4636,7 +4636,7 @@
           <a:p>
             <a:fld id="{CF62B505-841C-4C89-B392-8F545B9B6E7F}" type="datetimeFigureOut">
               <a:rPr lang="pt-BR" smtClean="0"/>
-              <a:t>03/09/2025</a:t>
+              <a:t>04/09/2025</a:t>
             </a:fld>
             <a:endParaRPr lang="pt-BR"/>
           </a:p>
@@ -4882,7 +4882,7 @@
           <a:p>
             <a:fld id="{CF62B505-841C-4C89-B392-8F545B9B6E7F}" type="datetimeFigureOut">
               <a:rPr lang="pt-BR" smtClean="0"/>
-              <a:t>03/09/2025</a:t>
+              <a:t>04/09/2025</a:t>
             </a:fld>
             <a:endParaRPr lang="pt-BR"/>
           </a:p>
@@ -5114,7 +5114,7 @@
           <a:p>
             <a:fld id="{CF62B505-841C-4C89-B392-8F545B9B6E7F}" type="datetimeFigureOut">
               <a:rPr lang="pt-BR" smtClean="0"/>
-              <a:t>03/09/2025</a:t>
+              <a:t>04/09/2025</a:t>
             </a:fld>
             <a:endParaRPr lang="pt-BR"/>
           </a:p>
@@ -5481,7 +5481,7 @@
           <a:p>
             <a:fld id="{CF62B505-841C-4C89-B392-8F545B9B6E7F}" type="datetimeFigureOut">
               <a:rPr lang="pt-BR" smtClean="0"/>
-              <a:t>03/09/2025</a:t>
+              <a:t>04/09/2025</a:t>
             </a:fld>
             <a:endParaRPr lang="pt-BR"/>
           </a:p>
@@ -5599,7 +5599,7 @@
           <a:p>
             <a:fld id="{CF62B505-841C-4C89-B392-8F545B9B6E7F}" type="datetimeFigureOut">
               <a:rPr lang="pt-BR" smtClean="0"/>
-              <a:t>03/09/2025</a:t>
+              <a:t>04/09/2025</a:t>
             </a:fld>
             <a:endParaRPr lang="pt-BR"/>
           </a:p>
@@ -5694,7 +5694,7 @@
           <a:p>
             <a:fld id="{CF62B505-841C-4C89-B392-8F545B9B6E7F}" type="datetimeFigureOut">
               <a:rPr lang="pt-BR" smtClean="0"/>
-              <a:t>03/09/2025</a:t>
+              <a:t>04/09/2025</a:t>
             </a:fld>
             <a:endParaRPr lang="pt-BR"/>
           </a:p>
@@ -5971,7 +5971,7 @@
           <a:p>
             <a:fld id="{CF62B505-841C-4C89-B392-8F545B9B6E7F}" type="datetimeFigureOut">
               <a:rPr lang="pt-BR" smtClean="0"/>
-              <a:t>03/09/2025</a:t>
+              <a:t>04/09/2025</a:t>
             </a:fld>
             <a:endParaRPr lang="pt-BR"/>
           </a:p>
@@ -6228,7 +6228,7 @@
           <a:p>
             <a:fld id="{CF62B505-841C-4C89-B392-8F545B9B6E7F}" type="datetimeFigureOut">
               <a:rPr lang="pt-BR" smtClean="0"/>
-              <a:t>03/09/2025</a:t>
+              <a:t>04/09/2025</a:t>
             </a:fld>
             <a:endParaRPr lang="pt-BR"/>
           </a:p>
@@ -6441,7 +6441,7 @@
           <a:p>
             <a:fld id="{CF62B505-841C-4C89-B392-8F545B9B6E7F}" type="datetimeFigureOut">
               <a:rPr lang="pt-BR" smtClean="0"/>
-              <a:t>03/09/2025</a:t>
+              <a:t>04/09/2025</a:t>
             </a:fld>
             <a:endParaRPr lang="pt-BR"/>
           </a:p>
@@ -6923,7 +6923,7 @@
         <p:spPr>
           <a:xfrm>
             <a:off x="324465" y="1120877"/>
-            <a:ext cx="25013264" cy="12890091"/>
+            <a:ext cx="25013264" cy="13010418"/>
           </a:xfrm>
           <a:prstGeom prst="roundRect">
             <a:avLst>
@@ -6978,8 +6978,8 @@
         </p:nvSpPr>
         <p:spPr>
           <a:xfrm rot="16200000">
-            <a:off x="-5466462" y="6899923"/>
-            <a:ext cx="12890092" cy="1332000"/>
+            <a:off x="-5526625" y="6960086"/>
+            <a:ext cx="13010418" cy="1332000"/>
           </a:xfrm>
           <a:prstGeom prst="round2SameRect">
             <a:avLst/>
@@ -7802,7 +7802,7 @@
         </p:nvSpPr>
         <p:spPr>
           <a:xfrm>
-            <a:off x="2478633" y="4385396"/>
+            <a:off x="2474842" y="4385396"/>
             <a:ext cx="9711892" cy="1027411"/>
           </a:xfrm>
           <a:prstGeom prst="roundRect">
@@ -7869,7 +7869,7 @@
         </p:nvSpPr>
         <p:spPr>
           <a:xfrm>
-            <a:off x="12457531" y="4385397"/>
+            <a:off x="12458722" y="4385397"/>
             <a:ext cx="2623931" cy="1027411"/>
           </a:xfrm>
           <a:prstGeom prst="roundRect">
@@ -7936,7 +7936,7 @@
         </p:nvSpPr>
         <p:spPr>
           <a:xfrm>
-            <a:off x="15335000" y="4385396"/>
+            <a:off x="15342297" y="4385396"/>
             <a:ext cx="2623931" cy="1027411"/>
           </a:xfrm>
           <a:prstGeom prst="roundRect">
@@ -8003,7 +8003,7 @@
         </p:nvSpPr>
         <p:spPr>
           <a:xfrm>
-            <a:off x="18225937" y="4385396"/>
+            <a:off x="18233234" y="4385396"/>
             <a:ext cx="2623931" cy="1027411"/>
           </a:xfrm>
           <a:prstGeom prst="roundRect">
@@ -8070,8 +8070,8 @@
         </p:nvSpPr>
         <p:spPr>
           <a:xfrm>
-            <a:off x="2467524" y="5788282"/>
-            <a:ext cx="4867055" cy="2254407"/>
+            <a:off x="2476075" y="5665961"/>
+            <a:ext cx="4867055" cy="3375281"/>
           </a:xfrm>
           <a:prstGeom prst="roundRect">
             <a:avLst>
@@ -8125,10 +8125,10 @@
       </p:sp>
       <p:sp>
         <p:nvSpPr>
-          <p:cNvPr id="158" name="Retângulo: Cantos Arredondados 157">
+          <p:cNvPr id="160" name="Retângulo: Cantos Arredondados 159">
             <a:extLst>
               <a:ext uri="{FF2B5EF4-FFF2-40B4-BE49-F238E27FC236}">
-                <a16:creationId xmlns:a16="http://schemas.microsoft.com/office/drawing/2014/main" id="{524CACD0-EF3A-F790-E98A-04AD8E831494}"/>
+                <a16:creationId xmlns:a16="http://schemas.microsoft.com/office/drawing/2014/main" id="{5B3CACDB-8549-22C2-3C50-6EEB777D2EC2}"/>
               </a:ext>
             </a:extLst>
           </p:cNvPr>
@@ -8137,8 +8137,8 @@
         </p:nvSpPr>
         <p:spPr>
           <a:xfrm>
-            <a:off x="7633251" y="5788282"/>
-            <a:ext cx="4557273" cy="1027411"/>
+            <a:off x="2464904" y="9294957"/>
+            <a:ext cx="4867055" cy="4710074"/>
           </a:xfrm>
           <a:prstGeom prst="roundRect">
             <a:avLst>
@@ -8192,408 +8192,6 @@
       </p:sp>
       <p:sp>
         <p:nvSpPr>
-          <p:cNvPr id="159" name="Retângulo: Cantos Arredondados 158">
-            <a:extLst>
-              <a:ext uri="{FF2B5EF4-FFF2-40B4-BE49-F238E27FC236}">
-                <a16:creationId xmlns:a16="http://schemas.microsoft.com/office/drawing/2014/main" id="{78473FF8-E381-6BA6-BACD-C6BA09EFFE1C}"/>
-              </a:ext>
-            </a:extLst>
-          </p:cNvPr>
-          <p:cNvSpPr/>
-          <p:nvPr/>
-        </p:nvSpPr>
-        <p:spPr>
-          <a:xfrm>
-            <a:off x="7633251" y="7015278"/>
-            <a:ext cx="4557273" cy="1027411"/>
-          </a:xfrm>
-          <a:prstGeom prst="roundRect">
-            <a:avLst>
-              <a:gd name="adj" fmla="val 16306"/>
-            </a:avLst>
-          </a:prstGeom>
-          <a:solidFill>
-            <a:schemeClr val="bg1"/>
-          </a:solidFill>
-          <a:ln>
-            <a:noFill/>
-          </a:ln>
-          <a:effectLst>
-            <a:glow rad="63500">
-              <a:schemeClr val="bg1">
-                <a:lumMod val="75000"/>
-                <a:alpha val="40000"/>
-              </a:schemeClr>
-            </a:glow>
-            <a:outerShdw blurRad="50800" dist="38100" dir="5400000" algn="t" rotWithShape="0">
-              <a:schemeClr val="tx1">
-                <a:alpha val="40000"/>
-              </a:schemeClr>
-            </a:outerShdw>
-          </a:effectLst>
-        </p:spPr>
-        <p:style>
-          <a:lnRef idx="2">
-            <a:schemeClr val="accent1">
-              <a:shade val="50000"/>
-            </a:schemeClr>
-          </a:lnRef>
-          <a:fillRef idx="1">
-            <a:schemeClr val="accent1"/>
-          </a:fillRef>
-          <a:effectRef idx="0">
-            <a:schemeClr val="accent1"/>
-          </a:effectRef>
-          <a:fontRef idx="minor">
-            <a:schemeClr val="lt1"/>
-          </a:fontRef>
-        </p:style>
-        <p:txBody>
-          <a:bodyPr rtlCol="0" anchor="ctr"/>
-          <a:lstStyle/>
-          <a:p>
-            <a:pPr algn="ctr"/>
-            <a:endParaRPr lang="pt-BR" sz="1265"/>
-          </a:p>
-        </p:txBody>
-      </p:sp>
-      <p:sp>
-        <p:nvSpPr>
-          <p:cNvPr id="160" name="Retângulo: Cantos Arredondados 159">
-            <a:extLst>
-              <a:ext uri="{FF2B5EF4-FFF2-40B4-BE49-F238E27FC236}">
-                <a16:creationId xmlns:a16="http://schemas.microsoft.com/office/drawing/2014/main" id="{5B3CACDB-8549-22C2-3C50-6EEB777D2EC2}"/>
-              </a:ext>
-            </a:extLst>
-          </p:cNvPr>
-          <p:cNvSpPr/>
-          <p:nvPr/>
-        </p:nvSpPr>
-        <p:spPr>
-          <a:xfrm>
-            <a:off x="2464904" y="8418164"/>
-            <a:ext cx="4867055" cy="4710073"/>
-          </a:xfrm>
-          <a:prstGeom prst="roundRect">
-            <a:avLst>
-              <a:gd name="adj" fmla="val 16306"/>
-            </a:avLst>
-          </a:prstGeom>
-          <a:solidFill>
-            <a:schemeClr val="bg1"/>
-          </a:solidFill>
-          <a:ln>
-            <a:noFill/>
-          </a:ln>
-          <a:effectLst>
-            <a:glow rad="63500">
-              <a:schemeClr val="bg1">
-                <a:lumMod val="75000"/>
-                <a:alpha val="40000"/>
-              </a:schemeClr>
-            </a:glow>
-            <a:outerShdw blurRad="50800" dist="38100" dir="5400000" algn="t" rotWithShape="0">
-              <a:schemeClr val="tx1">
-                <a:alpha val="40000"/>
-              </a:schemeClr>
-            </a:outerShdw>
-          </a:effectLst>
-        </p:spPr>
-        <p:style>
-          <a:lnRef idx="2">
-            <a:schemeClr val="accent1">
-              <a:shade val="50000"/>
-            </a:schemeClr>
-          </a:lnRef>
-          <a:fillRef idx="1">
-            <a:schemeClr val="accent1"/>
-          </a:fillRef>
-          <a:effectRef idx="0">
-            <a:schemeClr val="accent1"/>
-          </a:effectRef>
-          <a:fontRef idx="minor">
-            <a:schemeClr val="lt1"/>
-          </a:fontRef>
-        </p:style>
-        <p:txBody>
-          <a:bodyPr rtlCol="0" anchor="ctr"/>
-          <a:lstStyle/>
-          <a:p>
-            <a:pPr algn="ctr"/>
-            <a:endParaRPr lang="pt-BR" sz="1265"/>
-          </a:p>
-        </p:txBody>
-      </p:sp>
-      <p:sp>
-        <p:nvSpPr>
-          <p:cNvPr id="161" name="Retângulo: Cantos Arredondados 160">
-            <a:extLst>
-              <a:ext uri="{FF2B5EF4-FFF2-40B4-BE49-F238E27FC236}">
-                <a16:creationId xmlns:a16="http://schemas.microsoft.com/office/drawing/2014/main" id="{49B3881B-7A48-8347-FB81-1CD2CF072B24}"/>
-              </a:ext>
-            </a:extLst>
-          </p:cNvPr>
-          <p:cNvSpPr/>
-          <p:nvPr/>
-        </p:nvSpPr>
-        <p:spPr>
-          <a:xfrm>
-            <a:off x="7629462" y="8418165"/>
-            <a:ext cx="4557273" cy="1027411"/>
-          </a:xfrm>
-          <a:prstGeom prst="roundRect">
-            <a:avLst>
-              <a:gd name="adj" fmla="val 16306"/>
-            </a:avLst>
-          </a:prstGeom>
-          <a:solidFill>
-            <a:schemeClr val="bg1"/>
-          </a:solidFill>
-          <a:ln>
-            <a:noFill/>
-          </a:ln>
-          <a:effectLst>
-            <a:glow rad="63500">
-              <a:schemeClr val="bg1">
-                <a:lumMod val="75000"/>
-                <a:alpha val="40000"/>
-              </a:schemeClr>
-            </a:glow>
-            <a:outerShdw blurRad="50800" dist="38100" dir="5400000" algn="t" rotWithShape="0">
-              <a:schemeClr val="tx1">
-                <a:alpha val="40000"/>
-              </a:schemeClr>
-            </a:outerShdw>
-          </a:effectLst>
-        </p:spPr>
-        <p:style>
-          <a:lnRef idx="2">
-            <a:schemeClr val="accent1">
-              <a:shade val="50000"/>
-            </a:schemeClr>
-          </a:lnRef>
-          <a:fillRef idx="1">
-            <a:schemeClr val="accent1"/>
-          </a:fillRef>
-          <a:effectRef idx="0">
-            <a:schemeClr val="accent1"/>
-          </a:effectRef>
-          <a:fontRef idx="minor">
-            <a:schemeClr val="lt1"/>
-          </a:fontRef>
-        </p:style>
-        <p:txBody>
-          <a:bodyPr rtlCol="0" anchor="ctr"/>
-          <a:lstStyle/>
-          <a:p>
-            <a:pPr algn="ctr"/>
-            <a:endParaRPr lang="pt-BR" sz="1265"/>
-          </a:p>
-        </p:txBody>
-      </p:sp>
-      <p:sp>
-        <p:nvSpPr>
-          <p:cNvPr id="162" name="Retângulo: Cantos Arredondados 161">
-            <a:extLst>
-              <a:ext uri="{FF2B5EF4-FFF2-40B4-BE49-F238E27FC236}">
-                <a16:creationId xmlns:a16="http://schemas.microsoft.com/office/drawing/2014/main" id="{6DAA5D88-13F0-620D-E55B-96BD63A5CA5D}"/>
-              </a:ext>
-            </a:extLst>
-          </p:cNvPr>
-          <p:cNvSpPr/>
-          <p:nvPr/>
-        </p:nvSpPr>
-        <p:spPr>
-          <a:xfrm>
-            <a:off x="7629461" y="9645161"/>
-            <a:ext cx="4557273" cy="1027411"/>
-          </a:xfrm>
-          <a:prstGeom prst="roundRect">
-            <a:avLst>
-              <a:gd name="adj" fmla="val 16306"/>
-            </a:avLst>
-          </a:prstGeom>
-          <a:solidFill>
-            <a:schemeClr val="bg1"/>
-          </a:solidFill>
-          <a:ln>
-            <a:noFill/>
-          </a:ln>
-          <a:effectLst>
-            <a:glow rad="63500">
-              <a:schemeClr val="bg1">
-                <a:lumMod val="75000"/>
-                <a:alpha val="40000"/>
-              </a:schemeClr>
-            </a:glow>
-            <a:outerShdw blurRad="50800" dist="38100" dir="5400000" algn="t" rotWithShape="0">
-              <a:schemeClr val="tx1">
-                <a:alpha val="40000"/>
-              </a:schemeClr>
-            </a:outerShdw>
-          </a:effectLst>
-        </p:spPr>
-        <p:style>
-          <a:lnRef idx="2">
-            <a:schemeClr val="accent1">
-              <a:shade val="50000"/>
-            </a:schemeClr>
-          </a:lnRef>
-          <a:fillRef idx="1">
-            <a:schemeClr val="accent1"/>
-          </a:fillRef>
-          <a:effectRef idx="0">
-            <a:schemeClr val="accent1"/>
-          </a:effectRef>
-          <a:fontRef idx="minor">
-            <a:schemeClr val="lt1"/>
-          </a:fontRef>
-        </p:style>
-        <p:txBody>
-          <a:bodyPr rtlCol="0" anchor="ctr"/>
-          <a:lstStyle/>
-          <a:p>
-            <a:pPr algn="ctr"/>
-            <a:endParaRPr lang="pt-BR" sz="1265"/>
-          </a:p>
-        </p:txBody>
-      </p:sp>
-      <p:sp>
-        <p:nvSpPr>
-          <p:cNvPr id="163" name="Retângulo: Cantos Arredondados 162">
-            <a:extLst>
-              <a:ext uri="{FF2B5EF4-FFF2-40B4-BE49-F238E27FC236}">
-                <a16:creationId xmlns:a16="http://schemas.microsoft.com/office/drawing/2014/main" id="{43985C05-C428-95C7-F39B-072358ECF8AC}"/>
-              </a:ext>
-            </a:extLst>
-          </p:cNvPr>
-          <p:cNvSpPr/>
-          <p:nvPr/>
-        </p:nvSpPr>
-        <p:spPr>
-          <a:xfrm>
-            <a:off x="7629462" y="10873831"/>
-            <a:ext cx="4557273" cy="1027411"/>
-          </a:xfrm>
-          <a:prstGeom prst="roundRect">
-            <a:avLst>
-              <a:gd name="adj" fmla="val 16306"/>
-            </a:avLst>
-          </a:prstGeom>
-          <a:solidFill>
-            <a:schemeClr val="bg1"/>
-          </a:solidFill>
-          <a:ln>
-            <a:noFill/>
-          </a:ln>
-          <a:effectLst>
-            <a:glow rad="63500">
-              <a:schemeClr val="bg1">
-                <a:lumMod val="75000"/>
-                <a:alpha val="40000"/>
-              </a:schemeClr>
-            </a:glow>
-            <a:outerShdw blurRad="50800" dist="38100" dir="5400000" algn="t" rotWithShape="0">
-              <a:schemeClr val="tx1">
-                <a:alpha val="40000"/>
-              </a:schemeClr>
-            </a:outerShdw>
-          </a:effectLst>
-        </p:spPr>
-        <p:style>
-          <a:lnRef idx="2">
-            <a:schemeClr val="accent1">
-              <a:shade val="50000"/>
-            </a:schemeClr>
-          </a:lnRef>
-          <a:fillRef idx="1">
-            <a:schemeClr val="accent1"/>
-          </a:fillRef>
-          <a:effectRef idx="0">
-            <a:schemeClr val="accent1"/>
-          </a:effectRef>
-          <a:fontRef idx="minor">
-            <a:schemeClr val="lt1"/>
-          </a:fontRef>
-        </p:style>
-        <p:txBody>
-          <a:bodyPr rtlCol="0" anchor="ctr"/>
-          <a:lstStyle/>
-          <a:p>
-            <a:pPr algn="ctr"/>
-            <a:endParaRPr lang="pt-BR" sz="1265"/>
-          </a:p>
-        </p:txBody>
-      </p:sp>
-      <p:sp>
-        <p:nvSpPr>
-          <p:cNvPr id="164" name="Retângulo: Cantos Arredondados 163">
-            <a:extLst>
-              <a:ext uri="{FF2B5EF4-FFF2-40B4-BE49-F238E27FC236}">
-                <a16:creationId xmlns:a16="http://schemas.microsoft.com/office/drawing/2014/main" id="{E2E67F34-3487-9D3C-241F-0C78A967F15A}"/>
-              </a:ext>
-            </a:extLst>
-          </p:cNvPr>
-          <p:cNvSpPr/>
-          <p:nvPr/>
-        </p:nvSpPr>
-        <p:spPr>
-          <a:xfrm>
-            <a:off x="7629462" y="12100827"/>
-            <a:ext cx="4557273" cy="1027411"/>
-          </a:xfrm>
-          <a:prstGeom prst="roundRect">
-            <a:avLst>
-              <a:gd name="adj" fmla="val 16306"/>
-            </a:avLst>
-          </a:prstGeom>
-          <a:solidFill>
-            <a:schemeClr val="bg1"/>
-          </a:solidFill>
-          <a:ln>
-            <a:noFill/>
-          </a:ln>
-          <a:effectLst>
-            <a:glow rad="63500">
-              <a:schemeClr val="bg1">
-                <a:lumMod val="75000"/>
-                <a:alpha val="40000"/>
-              </a:schemeClr>
-            </a:glow>
-            <a:outerShdw blurRad="50800" dist="38100" dir="5400000" algn="t" rotWithShape="0">
-              <a:schemeClr val="tx1">
-                <a:alpha val="40000"/>
-              </a:schemeClr>
-            </a:outerShdw>
-          </a:effectLst>
-        </p:spPr>
-        <p:style>
-          <a:lnRef idx="2">
-            <a:schemeClr val="accent1">
-              <a:shade val="50000"/>
-            </a:schemeClr>
-          </a:lnRef>
-          <a:fillRef idx="1">
-            <a:schemeClr val="accent1"/>
-          </a:fillRef>
-          <a:effectRef idx="0">
-            <a:schemeClr val="accent1"/>
-          </a:effectRef>
-          <a:fontRef idx="minor">
-            <a:schemeClr val="lt1"/>
-          </a:fontRef>
-        </p:style>
-        <p:txBody>
-          <a:bodyPr rtlCol="0" anchor="ctr"/>
-          <a:lstStyle/>
-          <a:p>
-            <a:pPr algn="ctr"/>
-            <a:endParaRPr lang="pt-BR" sz="1265"/>
-          </a:p>
-        </p:txBody>
-      </p:sp>
-      <p:sp>
-        <p:nvSpPr>
           <p:cNvPr id="165" name="Retângulo: Cantos Arredondados 164">
             <a:extLst>
               <a:ext uri="{FF2B5EF4-FFF2-40B4-BE49-F238E27FC236}">
@@ -8606,7 +8204,7 @@
         </p:nvSpPr>
         <p:spPr>
           <a:xfrm>
-            <a:off x="12457530" y="5788282"/>
+            <a:off x="12467273" y="5665961"/>
             <a:ext cx="2623931" cy="1027411"/>
           </a:xfrm>
           <a:prstGeom prst="roundRect">
@@ -8673,7 +8271,7 @@
         </p:nvSpPr>
         <p:spPr>
           <a:xfrm>
-            <a:off x="15334999" y="5788281"/>
+            <a:off x="15350848" y="5665960"/>
             <a:ext cx="2623931" cy="1027411"/>
           </a:xfrm>
           <a:prstGeom prst="roundRect">
@@ -8740,7 +8338,7 @@
         </p:nvSpPr>
         <p:spPr>
           <a:xfrm>
-            <a:off x="18225936" y="5788281"/>
+            <a:off x="18241785" y="5665960"/>
             <a:ext cx="2623931" cy="1027411"/>
           </a:xfrm>
           <a:prstGeom prst="roundRect">
@@ -8807,7 +8405,7 @@
         </p:nvSpPr>
         <p:spPr>
           <a:xfrm>
-            <a:off x="12457530" y="7015278"/>
+            <a:off x="12467273" y="6839896"/>
             <a:ext cx="2623931" cy="1027411"/>
           </a:xfrm>
           <a:prstGeom prst="roundRect">
@@ -8874,7 +8472,7 @@
         </p:nvSpPr>
         <p:spPr>
           <a:xfrm>
-            <a:off x="15334999" y="7015277"/>
+            <a:off x="15350848" y="6839895"/>
             <a:ext cx="2623931" cy="1027411"/>
           </a:xfrm>
           <a:prstGeom prst="roundRect">
@@ -8941,7 +8539,7 @@
         </p:nvSpPr>
         <p:spPr>
           <a:xfrm>
-            <a:off x="18225936" y="7015277"/>
+            <a:off x="18241785" y="6839895"/>
             <a:ext cx="2623931" cy="1027411"/>
           </a:xfrm>
           <a:prstGeom prst="roundRect">
@@ -9008,7 +8606,7 @@
         </p:nvSpPr>
         <p:spPr>
           <a:xfrm>
-            <a:off x="12444064" y="8418164"/>
+            <a:off x="12458722" y="9294957"/>
             <a:ext cx="2623930" cy="1027411"/>
           </a:xfrm>
           <a:prstGeom prst="roundRect">
@@ -9075,7 +8673,7 @@
         </p:nvSpPr>
         <p:spPr>
           <a:xfrm>
-            <a:off x="15353383" y="8418163"/>
+            <a:off x="15342297" y="9294956"/>
             <a:ext cx="2623931" cy="1027411"/>
           </a:xfrm>
           <a:prstGeom prst="roundRect">
@@ -9142,7 +8740,7 @@
         </p:nvSpPr>
         <p:spPr>
           <a:xfrm>
-            <a:off x="18244320" y="8418163"/>
+            <a:off x="18233234" y="9294956"/>
             <a:ext cx="2623931" cy="1027411"/>
           </a:xfrm>
           <a:prstGeom prst="roundRect">
@@ -9209,7 +8807,7 @@
         </p:nvSpPr>
         <p:spPr>
           <a:xfrm>
-            <a:off x="12473379" y="9643281"/>
+            <a:off x="12458722" y="10520074"/>
             <a:ext cx="2623931" cy="1027411"/>
           </a:xfrm>
           <a:prstGeom prst="roundRect">
@@ -9276,7 +8874,7 @@
         </p:nvSpPr>
         <p:spPr>
           <a:xfrm>
-            <a:off x="15350848" y="9643280"/>
+            <a:off x="15342297" y="10520073"/>
             <a:ext cx="2623931" cy="1027411"/>
           </a:xfrm>
           <a:prstGeom prst="roundRect">
@@ -9343,7 +8941,7 @@
         </p:nvSpPr>
         <p:spPr>
           <a:xfrm>
-            <a:off x="18241785" y="9643280"/>
+            <a:off x="18233234" y="10520073"/>
             <a:ext cx="2623931" cy="1027411"/>
           </a:xfrm>
           <a:prstGeom prst="roundRect">
@@ -9410,7 +9008,7 @@
         </p:nvSpPr>
         <p:spPr>
           <a:xfrm>
-            <a:off x="12473379" y="10868397"/>
+            <a:off x="12458722" y="11747070"/>
             <a:ext cx="2623931" cy="1027411"/>
           </a:xfrm>
           <a:prstGeom prst="roundRect">
@@ -9477,7 +9075,7 @@
         </p:nvSpPr>
         <p:spPr>
           <a:xfrm>
-            <a:off x="15350848" y="10868396"/>
+            <a:off x="15342297" y="11747069"/>
             <a:ext cx="2623931" cy="1027411"/>
           </a:xfrm>
           <a:prstGeom prst="roundRect">
@@ -9544,7 +9142,7 @@
         </p:nvSpPr>
         <p:spPr>
           <a:xfrm>
-            <a:off x="18241785" y="10868396"/>
+            <a:off x="18233234" y="11747069"/>
             <a:ext cx="2623931" cy="1027411"/>
           </a:xfrm>
           <a:prstGeom prst="roundRect">
@@ -9611,7 +9209,7 @@
         </p:nvSpPr>
         <p:spPr>
           <a:xfrm>
-            <a:off x="12473379" y="12106764"/>
+            <a:off x="12458722" y="12983557"/>
             <a:ext cx="2623931" cy="1027411"/>
           </a:xfrm>
           <a:prstGeom prst="roundRect">
@@ -9678,7 +9276,7 @@
         </p:nvSpPr>
         <p:spPr>
           <a:xfrm>
-            <a:off x="15350848" y="12106763"/>
+            <a:off x="15342297" y="12983556"/>
             <a:ext cx="2623931" cy="1027411"/>
           </a:xfrm>
           <a:prstGeom prst="roundRect">
@@ -9745,7 +9343,7 @@
         </p:nvSpPr>
         <p:spPr>
           <a:xfrm>
-            <a:off x="18241785" y="12106763"/>
+            <a:off x="18233234" y="12983556"/>
             <a:ext cx="2623931" cy="1027411"/>
           </a:xfrm>
           <a:prstGeom prst="roundRect">
@@ -10100,6 +9698,1205 @@
               <a:endParaRPr lang="pt-BR" sz="1100" b="1" dirty="0">
                 <a:latin typeface="Montserrat" panose="00000500000000000000" pitchFamily="2" charset="0"/>
               </a:endParaRPr>
+            </a:p>
+          </p:txBody>
+        </p:sp>
+      </p:grpSp>
+      <p:sp>
+        <p:nvSpPr>
+          <p:cNvPr id="2" name="CaixaDeTexto 1">
+            <a:extLst>
+              <a:ext uri="{FF2B5EF4-FFF2-40B4-BE49-F238E27FC236}">
+                <a16:creationId xmlns:a16="http://schemas.microsoft.com/office/drawing/2014/main" id="{8EEB12B9-8229-8289-6D3A-C6DE546C125A}"/>
+              </a:ext>
+            </a:extLst>
+          </p:cNvPr>
+          <p:cNvSpPr txBox="1"/>
+          <p:nvPr/>
+        </p:nvSpPr>
+        <p:spPr>
+          <a:xfrm>
+            <a:off x="2474842" y="4606714"/>
+            <a:ext cx="9711892" cy="584775"/>
+          </a:xfrm>
+          <a:prstGeom prst="rect">
+            <a:avLst/>
+          </a:prstGeom>
+          <a:noFill/>
+        </p:spPr>
+        <p:txBody>
+          <a:bodyPr wrap="square" rtlCol="0">
+            <a:spAutoFit/>
+          </a:bodyPr>
+          <a:lstStyle/>
+          <a:p>
+            <a:r>
+              <a:rPr lang="pt-BR" sz="3200" b="1" dirty="0">
+                <a:latin typeface="Segoe UI" panose="020B0502040204020203" pitchFamily="34" charset="0"/>
+                <a:cs typeface="Segoe UI" panose="020B0502040204020203" pitchFamily="34" charset="0"/>
+              </a:rPr>
+              <a:t>TOTAL DE COLABORADORES</a:t>
+            </a:r>
+          </a:p>
+        </p:txBody>
+      </p:sp>
+      <p:sp>
+        <p:nvSpPr>
+          <p:cNvPr id="3" name="CaixaDeTexto 2">
+            <a:extLst>
+              <a:ext uri="{FF2B5EF4-FFF2-40B4-BE49-F238E27FC236}">
+                <a16:creationId xmlns:a16="http://schemas.microsoft.com/office/drawing/2014/main" id="{E5102F83-9EE3-AE10-0FEC-189545EA7258}"/>
+              </a:ext>
+            </a:extLst>
+          </p:cNvPr>
+          <p:cNvSpPr txBox="1"/>
+          <p:nvPr/>
+        </p:nvSpPr>
+        <p:spPr>
+          <a:xfrm>
+            <a:off x="2483393" y="7061214"/>
+            <a:ext cx="4857117" cy="584775"/>
+          </a:xfrm>
+          <a:prstGeom prst="rect">
+            <a:avLst/>
+          </a:prstGeom>
+          <a:noFill/>
+        </p:spPr>
+        <p:txBody>
+          <a:bodyPr wrap="square" rtlCol="0">
+            <a:spAutoFit/>
+          </a:bodyPr>
+          <a:lstStyle/>
+          <a:p>
+            <a:pPr algn="ctr"/>
+            <a:r>
+              <a:rPr lang="pt-BR" sz="3200" b="1" dirty="0">
+                <a:latin typeface="Segoe UI" panose="020B0502040204020203" pitchFamily="34" charset="0"/>
+                <a:cs typeface="Segoe UI" panose="020B0502040204020203" pitchFamily="34" charset="0"/>
+              </a:rPr>
+              <a:t>DIRETORIA</a:t>
+            </a:r>
+          </a:p>
+        </p:txBody>
+      </p:sp>
+      <p:sp>
+        <p:nvSpPr>
+          <p:cNvPr id="5" name="CaixaDeTexto 4">
+            <a:extLst>
+              <a:ext uri="{FF2B5EF4-FFF2-40B4-BE49-F238E27FC236}">
+                <a16:creationId xmlns:a16="http://schemas.microsoft.com/office/drawing/2014/main" id="{82F12346-26D4-DC18-7F7E-C31A7527D648}"/>
+              </a:ext>
+            </a:extLst>
+          </p:cNvPr>
+          <p:cNvSpPr txBox="1"/>
+          <p:nvPr/>
+        </p:nvSpPr>
+        <p:spPr>
+          <a:xfrm>
+            <a:off x="2474842" y="11357607"/>
+            <a:ext cx="4857117" cy="584775"/>
+          </a:xfrm>
+          <a:prstGeom prst="rect">
+            <a:avLst/>
+          </a:prstGeom>
+          <a:noFill/>
+        </p:spPr>
+        <p:txBody>
+          <a:bodyPr wrap="square" rtlCol="0">
+            <a:spAutoFit/>
+          </a:bodyPr>
+          <a:lstStyle/>
+          <a:p>
+            <a:pPr algn="ctr"/>
+            <a:r>
+              <a:rPr lang="pt-BR" sz="3200" b="1" dirty="0">
+                <a:latin typeface="Segoe UI" panose="020B0502040204020203" pitchFamily="34" charset="0"/>
+                <a:cs typeface="Segoe UI" panose="020B0502040204020203" pitchFamily="34" charset="0"/>
+              </a:rPr>
+              <a:t>TIME</a:t>
+            </a:r>
+          </a:p>
+        </p:txBody>
+      </p:sp>
+      <p:sp>
+        <p:nvSpPr>
+          <p:cNvPr id="11" name="Retângulo: Cantos Arredondados 10">
+            <a:extLst>
+              <a:ext uri="{FF2B5EF4-FFF2-40B4-BE49-F238E27FC236}">
+                <a16:creationId xmlns:a16="http://schemas.microsoft.com/office/drawing/2014/main" id="{8FC47550-7831-8B00-6984-754AB5086D81}"/>
+              </a:ext>
+            </a:extLst>
+          </p:cNvPr>
+          <p:cNvSpPr/>
+          <p:nvPr/>
+        </p:nvSpPr>
+        <p:spPr>
+          <a:xfrm>
+            <a:off x="12467273" y="8013832"/>
+            <a:ext cx="2623931" cy="1027411"/>
+          </a:xfrm>
+          <a:prstGeom prst="roundRect">
+            <a:avLst>
+              <a:gd name="adj" fmla="val 16306"/>
+            </a:avLst>
+          </a:prstGeom>
+          <a:solidFill>
+            <a:schemeClr val="bg1"/>
+          </a:solidFill>
+          <a:ln>
+            <a:noFill/>
+          </a:ln>
+          <a:effectLst>
+            <a:glow rad="63500">
+              <a:schemeClr val="bg1">
+                <a:lumMod val="75000"/>
+                <a:alpha val="40000"/>
+              </a:schemeClr>
+            </a:glow>
+            <a:outerShdw blurRad="50800" dist="38100" dir="5400000" algn="t" rotWithShape="0">
+              <a:schemeClr val="tx1">
+                <a:alpha val="40000"/>
+              </a:schemeClr>
+            </a:outerShdw>
+          </a:effectLst>
+        </p:spPr>
+        <p:style>
+          <a:lnRef idx="2">
+            <a:schemeClr val="accent1">
+              <a:shade val="50000"/>
+            </a:schemeClr>
+          </a:lnRef>
+          <a:fillRef idx="1">
+            <a:schemeClr val="accent1"/>
+          </a:fillRef>
+          <a:effectRef idx="0">
+            <a:schemeClr val="accent1"/>
+          </a:effectRef>
+          <a:fontRef idx="minor">
+            <a:schemeClr val="lt1"/>
+          </a:fontRef>
+        </p:style>
+        <p:txBody>
+          <a:bodyPr rtlCol="0" anchor="ctr"/>
+          <a:lstStyle/>
+          <a:p>
+            <a:pPr algn="ctr"/>
+            <a:endParaRPr lang="pt-BR" sz="1265"/>
+          </a:p>
+        </p:txBody>
+      </p:sp>
+      <p:sp>
+        <p:nvSpPr>
+          <p:cNvPr id="12" name="Retângulo: Cantos Arredondados 11">
+            <a:extLst>
+              <a:ext uri="{FF2B5EF4-FFF2-40B4-BE49-F238E27FC236}">
+                <a16:creationId xmlns:a16="http://schemas.microsoft.com/office/drawing/2014/main" id="{1BAFE5F5-5550-432C-2139-53D17AEBCCC8}"/>
+              </a:ext>
+            </a:extLst>
+          </p:cNvPr>
+          <p:cNvSpPr/>
+          <p:nvPr/>
+        </p:nvSpPr>
+        <p:spPr>
+          <a:xfrm>
+            <a:off x="15350848" y="8013831"/>
+            <a:ext cx="2623931" cy="1027411"/>
+          </a:xfrm>
+          <a:prstGeom prst="roundRect">
+            <a:avLst>
+              <a:gd name="adj" fmla="val 16306"/>
+            </a:avLst>
+          </a:prstGeom>
+          <a:solidFill>
+            <a:schemeClr val="bg1"/>
+          </a:solidFill>
+          <a:ln>
+            <a:noFill/>
+          </a:ln>
+          <a:effectLst>
+            <a:glow rad="63500">
+              <a:schemeClr val="bg1">
+                <a:lumMod val="75000"/>
+                <a:alpha val="40000"/>
+              </a:schemeClr>
+            </a:glow>
+            <a:outerShdw blurRad="50800" dist="38100" dir="5400000" algn="t" rotWithShape="0">
+              <a:schemeClr val="tx1">
+                <a:alpha val="40000"/>
+              </a:schemeClr>
+            </a:outerShdw>
+          </a:effectLst>
+        </p:spPr>
+        <p:style>
+          <a:lnRef idx="2">
+            <a:schemeClr val="accent1">
+              <a:shade val="50000"/>
+            </a:schemeClr>
+          </a:lnRef>
+          <a:fillRef idx="1">
+            <a:schemeClr val="accent1"/>
+          </a:fillRef>
+          <a:effectRef idx="0">
+            <a:schemeClr val="accent1"/>
+          </a:effectRef>
+          <a:fontRef idx="minor">
+            <a:schemeClr val="lt1"/>
+          </a:fontRef>
+        </p:style>
+        <p:txBody>
+          <a:bodyPr rtlCol="0" anchor="ctr"/>
+          <a:lstStyle/>
+          <a:p>
+            <a:pPr algn="ctr"/>
+            <a:endParaRPr lang="pt-BR" sz="1265"/>
+          </a:p>
+        </p:txBody>
+      </p:sp>
+      <p:sp>
+        <p:nvSpPr>
+          <p:cNvPr id="13" name="Retângulo: Cantos Arredondados 12">
+            <a:extLst>
+              <a:ext uri="{FF2B5EF4-FFF2-40B4-BE49-F238E27FC236}">
+                <a16:creationId xmlns:a16="http://schemas.microsoft.com/office/drawing/2014/main" id="{36B89301-1D27-56A8-3D03-5EA2FE87F13D}"/>
+              </a:ext>
+            </a:extLst>
+          </p:cNvPr>
+          <p:cNvSpPr/>
+          <p:nvPr/>
+        </p:nvSpPr>
+        <p:spPr>
+          <a:xfrm>
+            <a:off x="18241785" y="8013831"/>
+            <a:ext cx="2623931" cy="1027411"/>
+          </a:xfrm>
+          <a:prstGeom prst="roundRect">
+            <a:avLst>
+              <a:gd name="adj" fmla="val 16306"/>
+            </a:avLst>
+          </a:prstGeom>
+          <a:solidFill>
+            <a:schemeClr val="bg1"/>
+          </a:solidFill>
+          <a:ln>
+            <a:noFill/>
+          </a:ln>
+          <a:effectLst>
+            <a:glow rad="63500">
+              <a:schemeClr val="bg1">
+                <a:lumMod val="75000"/>
+                <a:alpha val="40000"/>
+              </a:schemeClr>
+            </a:glow>
+            <a:outerShdw blurRad="50800" dist="38100" dir="5400000" algn="t" rotWithShape="0">
+              <a:schemeClr val="tx1">
+                <a:alpha val="40000"/>
+              </a:schemeClr>
+            </a:outerShdw>
+          </a:effectLst>
+        </p:spPr>
+        <p:style>
+          <a:lnRef idx="2">
+            <a:schemeClr val="accent1">
+              <a:shade val="50000"/>
+            </a:schemeClr>
+          </a:lnRef>
+          <a:fillRef idx="1">
+            <a:schemeClr val="accent1"/>
+          </a:fillRef>
+          <a:effectRef idx="0">
+            <a:schemeClr val="accent1"/>
+          </a:effectRef>
+          <a:fontRef idx="minor">
+            <a:schemeClr val="lt1"/>
+          </a:fontRef>
+        </p:style>
+        <p:txBody>
+          <a:bodyPr rtlCol="0" anchor="ctr"/>
+          <a:lstStyle/>
+          <a:p>
+            <a:pPr algn="ctr"/>
+            <a:endParaRPr lang="pt-BR" sz="1265"/>
+          </a:p>
+        </p:txBody>
+      </p:sp>
+      <p:grpSp>
+        <p:nvGrpSpPr>
+          <p:cNvPr id="31" name="Agrupar 30">
+            <a:extLst>
+              <a:ext uri="{FF2B5EF4-FFF2-40B4-BE49-F238E27FC236}">
+                <a16:creationId xmlns:a16="http://schemas.microsoft.com/office/drawing/2014/main" id="{40A9665B-B4C5-46CC-FF62-DC3F6C46F468}"/>
+              </a:ext>
+            </a:extLst>
+          </p:cNvPr>
+          <p:cNvGrpSpPr/>
+          <p:nvPr/>
+        </p:nvGrpSpPr>
+        <p:grpSpPr>
+          <a:xfrm>
+            <a:off x="7667992" y="5665961"/>
+            <a:ext cx="4557273" cy="1027411"/>
+            <a:chOff x="7639907" y="5665961"/>
+            <a:chExt cx="4557273" cy="1027411"/>
+          </a:xfrm>
+        </p:grpSpPr>
+        <p:sp>
+          <p:nvSpPr>
+            <p:cNvPr id="158" name="Retângulo: Cantos Arredondados 157">
+              <a:extLst>
+                <a:ext uri="{FF2B5EF4-FFF2-40B4-BE49-F238E27FC236}">
+                  <a16:creationId xmlns:a16="http://schemas.microsoft.com/office/drawing/2014/main" id="{524CACD0-EF3A-F790-E98A-04AD8E831494}"/>
+                </a:ext>
+              </a:extLst>
+            </p:cNvPr>
+            <p:cNvSpPr/>
+            <p:nvPr/>
+          </p:nvSpPr>
+          <p:spPr>
+            <a:xfrm>
+              <a:off x="7639907" y="5665961"/>
+              <a:ext cx="4557273" cy="1027411"/>
+            </a:xfrm>
+            <a:prstGeom prst="roundRect">
+              <a:avLst>
+                <a:gd name="adj" fmla="val 16306"/>
+              </a:avLst>
+            </a:prstGeom>
+            <a:solidFill>
+              <a:schemeClr val="bg1"/>
+            </a:solidFill>
+            <a:ln>
+              <a:noFill/>
+            </a:ln>
+            <a:effectLst>
+              <a:glow rad="63500">
+                <a:schemeClr val="bg1">
+                  <a:lumMod val="75000"/>
+                  <a:alpha val="40000"/>
+                </a:schemeClr>
+              </a:glow>
+              <a:outerShdw blurRad="50800" dist="38100" dir="5400000" algn="t" rotWithShape="0">
+                <a:schemeClr val="tx1">
+                  <a:alpha val="40000"/>
+                </a:schemeClr>
+              </a:outerShdw>
+            </a:effectLst>
+          </p:spPr>
+          <p:style>
+            <a:lnRef idx="2">
+              <a:schemeClr val="accent1">
+                <a:shade val="50000"/>
+              </a:schemeClr>
+            </a:lnRef>
+            <a:fillRef idx="1">
+              <a:schemeClr val="accent1"/>
+            </a:fillRef>
+            <a:effectRef idx="0">
+              <a:schemeClr val="accent1"/>
+            </a:effectRef>
+            <a:fontRef idx="minor">
+              <a:schemeClr val="lt1"/>
+            </a:fontRef>
+          </p:style>
+          <p:txBody>
+            <a:bodyPr rtlCol="0" anchor="ctr"/>
+            <a:lstStyle/>
+            <a:p>
+              <a:pPr algn="ctr"/>
+              <a:endParaRPr lang="pt-BR" sz="1265"/>
+            </a:p>
+          </p:txBody>
+        </p:sp>
+        <p:sp>
+          <p:nvSpPr>
+            <p:cNvPr id="23" name="CaixaDeTexto 22">
+              <a:extLst>
+                <a:ext uri="{FF2B5EF4-FFF2-40B4-BE49-F238E27FC236}">
+                  <a16:creationId xmlns:a16="http://schemas.microsoft.com/office/drawing/2014/main" id="{9529BB95-03BF-C9E6-17AD-2945B5BABF91}"/>
+                </a:ext>
+              </a:extLst>
+            </p:cNvPr>
+            <p:cNvSpPr txBox="1"/>
+            <p:nvPr/>
+          </p:nvSpPr>
+          <p:spPr>
+            <a:xfrm>
+              <a:off x="7639907" y="5887279"/>
+              <a:ext cx="3410714" cy="584775"/>
+            </a:xfrm>
+            <a:prstGeom prst="rect">
+              <a:avLst/>
+            </a:prstGeom>
+            <a:noFill/>
+          </p:spPr>
+          <p:txBody>
+            <a:bodyPr wrap="square" rtlCol="0">
+              <a:spAutoFit/>
+            </a:bodyPr>
+            <a:lstStyle/>
+            <a:p>
+              <a:r>
+                <a:rPr lang="pt-BR" sz="3200" b="1" dirty="0">
+                  <a:latin typeface="Segoe UI" panose="020B0502040204020203" pitchFamily="34" charset="0"/>
+                  <a:cs typeface="Segoe UI" panose="020B0502040204020203" pitchFamily="34" charset="0"/>
+                </a:rPr>
+                <a:t>COMERCIAL</a:t>
+              </a:r>
+            </a:p>
+          </p:txBody>
+        </p:sp>
+      </p:grpSp>
+      <p:grpSp>
+        <p:nvGrpSpPr>
+          <p:cNvPr id="32" name="Agrupar 31">
+            <a:extLst>
+              <a:ext uri="{FF2B5EF4-FFF2-40B4-BE49-F238E27FC236}">
+                <a16:creationId xmlns:a16="http://schemas.microsoft.com/office/drawing/2014/main" id="{E084E14C-DC23-4143-ECA9-714FC33C9C00}"/>
+              </a:ext>
+            </a:extLst>
+          </p:cNvPr>
+          <p:cNvGrpSpPr/>
+          <p:nvPr/>
+        </p:nvGrpSpPr>
+        <p:grpSpPr>
+          <a:xfrm>
+            <a:off x="7667992" y="6839896"/>
+            <a:ext cx="4557273" cy="1027411"/>
+            <a:chOff x="7639907" y="6839896"/>
+            <a:chExt cx="4557273" cy="1027411"/>
+          </a:xfrm>
+        </p:grpSpPr>
+        <p:sp>
+          <p:nvSpPr>
+            <p:cNvPr id="159" name="Retângulo: Cantos Arredondados 158">
+              <a:extLst>
+                <a:ext uri="{FF2B5EF4-FFF2-40B4-BE49-F238E27FC236}">
+                  <a16:creationId xmlns:a16="http://schemas.microsoft.com/office/drawing/2014/main" id="{78473FF8-E381-6BA6-BACD-C6BA09EFFE1C}"/>
+                </a:ext>
+              </a:extLst>
+            </p:cNvPr>
+            <p:cNvSpPr/>
+            <p:nvPr/>
+          </p:nvSpPr>
+          <p:spPr>
+            <a:xfrm>
+              <a:off x="7639907" y="6839896"/>
+              <a:ext cx="4557273" cy="1027411"/>
+            </a:xfrm>
+            <a:prstGeom prst="roundRect">
+              <a:avLst>
+                <a:gd name="adj" fmla="val 16306"/>
+              </a:avLst>
+            </a:prstGeom>
+            <a:solidFill>
+              <a:schemeClr val="bg1"/>
+            </a:solidFill>
+            <a:ln>
+              <a:noFill/>
+            </a:ln>
+            <a:effectLst>
+              <a:glow rad="63500">
+                <a:schemeClr val="bg1">
+                  <a:lumMod val="75000"/>
+                  <a:alpha val="40000"/>
+                </a:schemeClr>
+              </a:glow>
+              <a:outerShdw blurRad="50800" dist="38100" dir="5400000" algn="t" rotWithShape="0">
+                <a:schemeClr val="tx1">
+                  <a:alpha val="40000"/>
+                </a:schemeClr>
+              </a:outerShdw>
+            </a:effectLst>
+          </p:spPr>
+          <p:style>
+            <a:lnRef idx="2">
+              <a:schemeClr val="accent1">
+                <a:shade val="50000"/>
+              </a:schemeClr>
+            </a:lnRef>
+            <a:fillRef idx="1">
+              <a:schemeClr val="accent1"/>
+            </a:fillRef>
+            <a:effectRef idx="0">
+              <a:schemeClr val="accent1"/>
+            </a:effectRef>
+            <a:fontRef idx="minor">
+              <a:schemeClr val="lt1"/>
+            </a:fontRef>
+          </p:style>
+          <p:txBody>
+            <a:bodyPr rtlCol="0" anchor="ctr"/>
+            <a:lstStyle/>
+            <a:p>
+              <a:pPr algn="ctr"/>
+              <a:endParaRPr lang="pt-BR" sz="1265"/>
+            </a:p>
+          </p:txBody>
+        </p:sp>
+        <p:sp>
+          <p:nvSpPr>
+            <p:cNvPr id="24" name="CaixaDeTexto 23">
+              <a:extLst>
+                <a:ext uri="{FF2B5EF4-FFF2-40B4-BE49-F238E27FC236}">
+                  <a16:creationId xmlns:a16="http://schemas.microsoft.com/office/drawing/2014/main" id="{095DEDA3-7C03-313C-BBAC-A3004281B18E}"/>
+                </a:ext>
+              </a:extLst>
+            </p:cNvPr>
+            <p:cNvSpPr txBox="1"/>
+            <p:nvPr/>
+          </p:nvSpPr>
+          <p:spPr>
+            <a:xfrm>
+              <a:off x="7639907" y="7061214"/>
+              <a:ext cx="3410714" cy="584775"/>
+            </a:xfrm>
+            <a:prstGeom prst="rect">
+              <a:avLst/>
+            </a:prstGeom>
+            <a:noFill/>
+          </p:spPr>
+          <p:txBody>
+            <a:bodyPr wrap="square" rtlCol="0">
+              <a:spAutoFit/>
+            </a:bodyPr>
+            <a:lstStyle/>
+            <a:p>
+              <a:r>
+                <a:rPr lang="pt-BR" sz="3200" b="1" dirty="0">
+                  <a:latin typeface="Segoe UI" panose="020B0502040204020203" pitchFamily="34" charset="0"/>
+                  <a:cs typeface="Segoe UI" panose="020B0502040204020203" pitchFamily="34" charset="0"/>
+                </a:rPr>
+                <a:t>OPERAÇÕES</a:t>
+              </a:r>
+            </a:p>
+          </p:txBody>
+        </p:sp>
+      </p:grpSp>
+      <p:grpSp>
+        <p:nvGrpSpPr>
+          <p:cNvPr id="33" name="Agrupar 32">
+            <a:extLst>
+              <a:ext uri="{FF2B5EF4-FFF2-40B4-BE49-F238E27FC236}">
+                <a16:creationId xmlns:a16="http://schemas.microsoft.com/office/drawing/2014/main" id="{A06652C7-2157-8488-947E-5FBA357F118C}"/>
+              </a:ext>
+            </a:extLst>
+          </p:cNvPr>
+          <p:cNvGrpSpPr/>
+          <p:nvPr/>
+        </p:nvGrpSpPr>
+        <p:grpSpPr>
+          <a:xfrm>
+            <a:off x="7667992" y="8013831"/>
+            <a:ext cx="4557273" cy="1027411"/>
+            <a:chOff x="7704627" y="8013831"/>
+            <a:chExt cx="4557273" cy="1027411"/>
+          </a:xfrm>
+        </p:grpSpPr>
+        <p:sp>
+          <p:nvSpPr>
+            <p:cNvPr id="9" name="Retângulo: Cantos Arredondados 8">
+              <a:extLst>
+                <a:ext uri="{FF2B5EF4-FFF2-40B4-BE49-F238E27FC236}">
+                  <a16:creationId xmlns:a16="http://schemas.microsoft.com/office/drawing/2014/main" id="{78129B35-0257-E9DC-F8E8-4D2A1CA5379E}"/>
+                </a:ext>
+              </a:extLst>
+            </p:cNvPr>
+            <p:cNvSpPr/>
+            <p:nvPr/>
+          </p:nvSpPr>
+          <p:spPr>
+            <a:xfrm>
+              <a:off x="7704627" y="8013831"/>
+              <a:ext cx="4557273" cy="1027411"/>
+            </a:xfrm>
+            <a:prstGeom prst="roundRect">
+              <a:avLst>
+                <a:gd name="adj" fmla="val 16306"/>
+              </a:avLst>
+            </a:prstGeom>
+            <a:solidFill>
+              <a:schemeClr val="bg1"/>
+            </a:solidFill>
+            <a:ln>
+              <a:noFill/>
+            </a:ln>
+            <a:effectLst>
+              <a:glow rad="63500">
+                <a:schemeClr val="bg1">
+                  <a:lumMod val="75000"/>
+                  <a:alpha val="40000"/>
+                </a:schemeClr>
+              </a:glow>
+              <a:outerShdw blurRad="50800" dist="38100" dir="5400000" algn="t" rotWithShape="0">
+                <a:schemeClr val="tx1">
+                  <a:alpha val="40000"/>
+                </a:schemeClr>
+              </a:outerShdw>
+            </a:effectLst>
+          </p:spPr>
+          <p:style>
+            <a:lnRef idx="2">
+              <a:schemeClr val="accent1">
+                <a:shade val="50000"/>
+              </a:schemeClr>
+            </a:lnRef>
+            <a:fillRef idx="1">
+              <a:schemeClr val="accent1"/>
+            </a:fillRef>
+            <a:effectRef idx="0">
+              <a:schemeClr val="accent1"/>
+            </a:effectRef>
+            <a:fontRef idx="minor">
+              <a:schemeClr val="lt1"/>
+            </a:fontRef>
+          </p:style>
+          <p:txBody>
+            <a:bodyPr rtlCol="0" anchor="ctr"/>
+            <a:lstStyle/>
+            <a:p>
+              <a:pPr algn="ctr"/>
+              <a:endParaRPr lang="pt-BR" sz="1265"/>
+            </a:p>
+          </p:txBody>
+        </p:sp>
+        <p:sp>
+          <p:nvSpPr>
+            <p:cNvPr id="25" name="CaixaDeTexto 24">
+              <a:extLst>
+                <a:ext uri="{FF2B5EF4-FFF2-40B4-BE49-F238E27FC236}">
+                  <a16:creationId xmlns:a16="http://schemas.microsoft.com/office/drawing/2014/main" id="{54948802-8DEE-48EF-520A-C6FF4E3F9B5B}"/>
+                </a:ext>
+              </a:extLst>
+            </p:cNvPr>
+            <p:cNvSpPr txBox="1"/>
+            <p:nvPr/>
+          </p:nvSpPr>
+          <p:spPr>
+            <a:xfrm>
+              <a:off x="7704627" y="8235149"/>
+              <a:ext cx="3410714" cy="584775"/>
+            </a:xfrm>
+            <a:prstGeom prst="rect">
+              <a:avLst/>
+            </a:prstGeom>
+            <a:noFill/>
+          </p:spPr>
+          <p:txBody>
+            <a:bodyPr wrap="square" rtlCol="0">
+              <a:spAutoFit/>
+            </a:bodyPr>
+            <a:lstStyle/>
+            <a:p>
+              <a:r>
+                <a:rPr lang="pt-BR" sz="3200" b="1" dirty="0">
+                  <a:latin typeface="Segoe UI" panose="020B0502040204020203" pitchFamily="34" charset="0"/>
+                  <a:cs typeface="Segoe UI" panose="020B0502040204020203" pitchFamily="34" charset="0"/>
+                </a:rPr>
+                <a:t>ADM-FIN</a:t>
+              </a:r>
+            </a:p>
+          </p:txBody>
+        </p:sp>
+      </p:grpSp>
+      <p:grpSp>
+        <p:nvGrpSpPr>
+          <p:cNvPr id="34" name="Agrupar 33">
+            <a:extLst>
+              <a:ext uri="{FF2B5EF4-FFF2-40B4-BE49-F238E27FC236}">
+                <a16:creationId xmlns:a16="http://schemas.microsoft.com/office/drawing/2014/main" id="{CE5A3EC6-5C39-3B4F-16E0-737545EABA0E}"/>
+              </a:ext>
+            </a:extLst>
+          </p:cNvPr>
+          <p:cNvGrpSpPr/>
+          <p:nvPr/>
+        </p:nvGrpSpPr>
+        <p:grpSpPr>
+          <a:xfrm>
+            <a:off x="7667992" y="9294958"/>
+            <a:ext cx="4557273" cy="1027411"/>
+            <a:chOff x="7631356" y="9294958"/>
+            <a:chExt cx="4557273" cy="1027411"/>
+          </a:xfrm>
+        </p:grpSpPr>
+        <p:sp>
+          <p:nvSpPr>
+            <p:cNvPr id="161" name="Retângulo: Cantos Arredondados 160">
+              <a:extLst>
+                <a:ext uri="{FF2B5EF4-FFF2-40B4-BE49-F238E27FC236}">
+                  <a16:creationId xmlns:a16="http://schemas.microsoft.com/office/drawing/2014/main" id="{49B3881B-7A48-8347-FB81-1CD2CF072B24}"/>
+                </a:ext>
+              </a:extLst>
+            </p:cNvPr>
+            <p:cNvSpPr/>
+            <p:nvPr/>
+          </p:nvSpPr>
+          <p:spPr>
+            <a:xfrm>
+              <a:off x="7631356" y="9294958"/>
+              <a:ext cx="4557273" cy="1027411"/>
+            </a:xfrm>
+            <a:prstGeom prst="roundRect">
+              <a:avLst>
+                <a:gd name="adj" fmla="val 16306"/>
+              </a:avLst>
+            </a:prstGeom>
+            <a:solidFill>
+              <a:schemeClr val="bg1"/>
+            </a:solidFill>
+            <a:ln>
+              <a:noFill/>
+            </a:ln>
+            <a:effectLst>
+              <a:glow rad="63500">
+                <a:schemeClr val="bg1">
+                  <a:lumMod val="75000"/>
+                  <a:alpha val="40000"/>
+                </a:schemeClr>
+              </a:glow>
+              <a:outerShdw blurRad="50800" dist="38100" dir="5400000" algn="t" rotWithShape="0">
+                <a:schemeClr val="tx1">
+                  <a:alpha val="40000"/>
+                </a:schemeClr>
+              </a:outerShdw>
+            </a:effectLst>
+          </p:spPr>
+          <p:style>
+            <a:lnRef idx="2">
+              <a:schemeClr val="accent1">
+                <a:shade val="50000"/>
+              </a:schemeClr>
+            </a:lnRef>
+            <a:fillRef idx="1">
+              <a:schemeClr val="accent1"/>
+            </a:fillRef>
+            <a:effectRef idx="0">
+              <a:schemeClr val="accent1"/>
+            </a:effectRef>
+            <a:fontRef idx="minor">
+              <a:schemeClr val="lt1"/>
+            </a:fontRef>
+          </p:style>
+          <p:txBody>
+            <a:bodyPr rtlCol="0" anchor="ctr"/>
+            <a:lstStyle/>
+            <a:p>
+              <a:pPr algn="ctr"/>
+              <a:endParaRPr lang="pt-BR" sz="1265"/>
+            </a:p>
+          </p:txBody>
+        </p:sp>
+        <p:sp>
+          <p:nvSpPr>
+            <p:cNvPr id="26" name="CaixaDeTexto 25">
+              <a:extLst>
+                <a:ext uri="{FF2B5EF4-FFF2-40B4-BE49-F238E27FC236}">
+                  <a16:creationId xmlns:a16="http://schemas.microsoft.com/office/drawing/2014/main" id="{2CEF11F5-21D6-BFA4-DFC4-E34E0BE42C3A}"/>
+                </a:ext>
+              </a:extLst>
+            </p:cNvPr>
+            <p:cNvSpPr txBox="1"/>
+            <p:nvPr/>
+          </p:nvSpPr>
+          <p:spPr>
+            <a:xfrm>
+              <a:off x="7631356" y="9516276"/>
+              <a:ext cx="3410714" cy="584775"/>
+            </a:xfrm>
+            <a:prstGeom prst="rect">
+              <a:avLst/>
+            </a:prstGeom>
+            <a:noFill/>
+          </p:spPr>
+          <p:txBody>
+            <a:bodyPr wrap="square" rtlCol="0">
+              <a:spAutoFit/>
+            </a:bodyPr>
+            <a:lstStyle/>
+            <a:p>
+              <a:r>
+                <a:rPr lang="pt-BR" sz="3200" b="1" dirty="0">
+                  <a:latin typeface="Segoe UI" panose="020B0502040204020203" pitchFamily="34" charset="0"/>
+                  <a:cs typeface="Segoe UI" panose="020B0502040204020203" pitchFamily="34" charset="0"/>
+                </a:rPr>
+                <a:t>LOJA</a:t>
+              </a:r>
+            </a:p>
+          </p:txBody>
+        </p:sp>
+      </p:grpSp>
+      <p:grpSp>
+        <p:nvGrpSpPr>
+          <p:cNvPr id="36" name="Agrupar 35">
+            <a:extLst>
+              <a:ext uri="{FF2B5EF4-FFF2-40B4-BE49-F238E27FC236}">
+                <a16:creationId xmlns:a16="http://schemas.microsoft.com/office/drawing/2014/main" id="{752CFBD6-FF47-F052-9E90-A8F2BFD47D24}"/>
+              </a:ext>
+            </a:extLst>
+          </p:cNvPr>
+          <p:cNvGrpSpPr/>
+          <p:nvPr/>
+        </p:nvGrpSpPr>
+        <p:grpSpPr>
+          <a:xfrm>
+            <a:off x="7667992" y="10521954"/>
+            <a:ext cx="4557273" cy="1027411"/>
+            <a:chOff x="7631356" y="10521954"/>
+            <a:chExt cx="4557273" cy="1027411"/>
+          </a:xfrm>
+        </p:grpSpPr>
+        <p:sp>
+          <p:nvSpPr>
+            <p:cNvPr id="162" name="Retângulo: Cantos Arredondados 161">
+              <a:extLst>
+                <a:ext uri="{FF2B5EF4-FFF2-40B4-BE49-F238E27FC236}">
+                  <a16:creationId xmlns:a16="http://schemas.microsoft.com/office/drawing/2014/main" id="{6DAA5D88-13F0-620D-E55B-96BD63A5CA5D}"/>
+                </a:ext>
+              </a:extLst>
+            </p:cNvPr>
+            <p:cNvSpPr/>
+            <p:nvPr/>
+          </p:nvSpPr>
+          <p:spPr>
+            <a:xfrm>
+              <a:off x="7631356" y="10521954"/>
+              <a:ext cx="4557273" cy="1027411"/>
+            </a:xfrm>
+            <a:prstGeom prst="roundRect">
+              <a:avLst>
+                <a:gd name="adj" fmla="val 16306"/>
+              </a:avLst>
+            </a:prstGeom>
+            <a:solidFill>
+              <a:schemeClr val="bg1"/>
+            </a:solidFill>
+            <a:ln>
+              <a:noFill/>
+            </a:ln>
+            <a:effectLst>
+              <a:glow rad="63500">
+                <a:schemeClr val="bg1">
+                  <a:lumMod val="75000"/>
+                  <a:alpha val="40000"/>
+                </a:schemeClr>
+              </a:glow>
+              <a:outerShdw blurRad="50800" dist="38100" dir="5400000" algn="t" rotWithShape="0">
+                <a:schemeClr val="tx1">
+                  <a:alpha val="40000"/>
+                </a:schemeClr>
+              </a:outerShdw>
+            </a:effectLst>
+          </p:spPr>
+          <p:style>
+            <a:lnRef idx="2">
+              <a:schemeClr val="accent1">
+                <a:shade val="50000"/>
+              </a:schemeClr>
+            </a:lnRef>
+            <a:fillRef idx="1">
+              <a:schemeClr val="accent1"/>
+            </a:fillRef>
+            <a:effectRef idx="0">
+              <a:schemeClr val="accent1"/>
+            </a:effectRef>
+            <a:fontRef idx="minor">
+              <a:schemeClr val="lt1"/>
+            </a:fontRef>
+          </p:style>
+          <p:txBody>
+            <a:bodyPr rtlCol="0" anchor="ctr"/>
+            <a:lstStyle/>
+            <a:p>
+              <a:pPr algn="ctr"/>
+              <a:endParaRPr lang="pt-BR" sz="1265"/>
+            </a:p>
+          </p:txBody>
+        </p:sp>
+        <p:sp>
+          <p:nvSpPr>
+            <p:cNvPr id="28" name="CaixaDeTexto 27">
+              <a:extLst>
+                <a:ext uri="{FF2B5EF4-FFF2-40B4-BE49-F238E27FC236}">
+                  <a16:creationId xmlns:a16="http://schemas.microsoft.com/office/drawing/2014/main" id="{41EBA048-ED6B-3F5C-2097-800840A56EA9}"/>
+                </a:ext>
+              </a:extLst>
+            </p:cNvPr>
+            <p:cNvSpPr txBox="1"/>
+            <p:nvPr/>
+          </p:nvSpPr>
+          <p:spPr>
+            <a:xfrm>
+              <a:off x="7631356" y="10743272"/>
+              <a:ext cx="3410714" cy="584775"/>
+            </a:xfrm>
+            <a:prstGeom prst="rect">
+              <a:avLst/>
+            </a:prstGeom>
+            <a:noFill/>
+          </p:spPr>
+          <p:txBody>
+            <a:bodyPr wrap="square" rtlCol="0">
+              <a:spAutoFit/>
+            </a:bodyPr>
+            <a:lstStyle/>
+            <a:p>
+              <a:r>
+                <a:rPr lang="pt-BR" sz="3200" b="1" dirty="0">
+                  <a:latin typeface="Segoe UI" panose="020B0502040204020203" pitchFamily="34" charset="0"/>
+                  <a:cs typeface="Segoe UI" panose="020B0502040204020203" pitchFamily="34" charset="0"/>
+                </a:rPr>
+                <a:t>VD</a:t>
+              </a:r>
+            </a:p>
+          </p:txBody>
+        </p:sp>
+      </p:grpSp>
+      <p:grpSp>
+        <p:nvGrpSpPr>
+          <p:cNvPr id="37" name="Agrupar 36">
+            <a:extLst>
+              <a:ext uri="{FF2B5EF4-FFF2-40B4-BE49-F238E27FC236}">
+                <a16:creationId xmlns:a16="http://schemas.microsoft.com/office/drawing/2014/main" id="{BA794DE4-65A8-AA72-60D1-ED3B6EAA136D}"/>
+              </a:ext>
+            </a:extLst>
+          </p:cNvPr>
+          <p:cNvGrpSpPr/>
+          <p:nvPr/>
+        </p:nvGrpSpPr>
+        <p:grpSpPr>
+          <a:xfrm>
+            <a:off x="7667992" y="11752504"/>
+            <a:ext cx="4557273" cy="1027411"/>
+            <a:chOff x="7631356" y="11752504"/>
+            <a:chExt cx="4557273" cy="1027411"/>
+          </a:xfrm>
+        </p:grpSpPr>
+        <p:sp>
+          <p:nvSpPr>
+            <p:cNvPr id="163" name="Retângulo: Cantos Arredondados 162">
+              <a:extLst>
+                <a:ext uri="{FF2B5EF4-FFF2-40B4-BE49-F238E27FC236}">
+                  <a16:creationId xmlns:a16="http://schemas.microsoft.com/office/drawing/2014/main" id="{43985C05-C428-95C7-F39B-072358ECF8AC}"/>
+                </a:ext>
+              </a:extLst>
+            </p:cNvPr>
+            <p:cNvSpPr/>
+            <p:nvPr/>
+          </p:nvSpPr>
+          <p:spPr>
+            <a:xfrm>
+              <a:off x="7631356" y="11752504"/>
+              <a:ext cx="4557273" cy="1027411"/>
+            </a:xfrm>
+            <a:prstGeom prst="roundRect">
+              <a:avLst>
+                <a:gd name="adj" fmla="val 16306"/>
+              </a:avLst>
+            </a:prstGeom>
+            <a:solidFill>
+              <a:schemeClr val="bg1"/>
+            </a:solidFill>
+            <a:ln>
+              <a:noFill/>
+            </a:ln>
+            <a:effectLst>
+              <a:glow rad="63500">
+                <a:schemeClr val="bg1">
+                  <a:lumMod val="75000"/>
+                  <a:alpha val="40000"/>
+                </a:schemeClr>
+              </a:glow>
+              <a:outerShdw blurRad="50800" dist="38100" dir="5400000" algn="t" rotWithShape="0">
+                <a:schemeClr val="tx1">
+                  <a:alpha val="40000"/>
+                </a:schemeClr>
+              </a:outerShdw>
+            </a:effectLst>
+          </p:spPr>
+          <p:style>
+            <a:lnRef idx="2">
+              <a:schemeClr val="accent1">
+                <a:shade val="50000"/>
+              </a:schemeClr>
+            </a:lnRef>
+            <a:fillRef idx="1">
+              <a:schemeClr val="accent1"/>
+            </a:fillRef>
+            <a:effectRef idx="0">
+              <a:schemeClr val="accent1"/>
+            </a:effectRef>
+            <a:fontRef idx="minor">
+              <a:schemeClr val="lt1"/>
+            </a:fontRef>
+          </p:style>
+          <p:txBody>
+            <a:bodyPr rtlCol="0" anchor="ctr"/>
+            <a:lstStyle/>
+            <a:p>
+              <a:pPr algn="ctr"/>
+              <a:endParaRPr lang="pt-BR" sz="1265"/>
+            </a:p>
+          </p:txBody>
+        </p:sp>
+        <p:sp>
+          <p:nvSpPr>
+            <p:cNvPr id="29" name="CaixaDeTexto 28">
+              <a:extLst>
+                <a:ext uri="{FF2B5EF4-FFF2-40B4-BE49-F238E27FC236}">
+                  <a16:creationId xmlns:a16="http://schemas.microsoft.com/office/drawing/2014/main" id="{15B1C0CD-3149-330F-F6BE-17B3ABDDCC29}"/>
+                </a:ext>
+              </a:extLst>
+            </p:cNvPr>
+            <p:cNvSpPr txBox="1"/>
+            <p:nvPr/>
+          </p:nvSpPr>
+          <p:spPr>
+            <a:xfrm>
+              <a:off x="7631356" y="11973822"/>
+              <a:ext cx="3410714" cy="584775"/>
+            </a:xfrm>
+            <a:prstGeom prst="rect">
+              <a:avLst/>
+            </a:prstGeom>
+            <a:noFill/>
+          </p:spPr>
+          <p:txBody>
+            <a:bodyPr wrap="square" rtlCol="0">
+              <a:spAutoFit/>
+            </a:bodyPr>
+            <a:lstStyle/>
+            <a:p>
+              <a:r>
+                <a:rPr lang="pt-BR" sz="3200" b="1" dirty="0">
+                  <a:latin typeface="Segoe UI" panose="020B0502040204020203" pitchFamily="34" charset="0"/>
+                  <a:cs typeface="Segoe UI" panose="020B0502040204020203" pitchFamily="34" charset="0"/>
+                </a:rPr>
+                <a:t>ADM</a:t>
+              </a:r>
+            </a:p>
+          </p:txBody>
+        </p:sp>
+      </p:grpSp>
+      <p:grpSp>
+        <p:nvGrpSpPr>
+          <p:cNvPr id="38" name="Agrupar 37">
+            <a:extLst>
+              <a:ext uri="{FF2B5EF4-FFF2-40B4-BE49-F238E27FC236}">
+                <a16:creationId xmlns:a16="http://schemas.microsoft.com/office/drawing/2014/main" id="{58CD51EE-993B-0512-D60C-AC8C26C073A1}"/>
+              </a:ext>
+            </a:extLst>
+          </p:cNvPr>
+          <p:cNvGrpSpPr/>
+          <p:nvPr/>
+        </p:nvGrpSpPr>
+        <p:grpSpPr>
+          <a:xfrm>
+            <a:off x="7667992" y="12977620"/>
+            <a:ext cx="4557273" cy="1027411"/>
+            <a:chOff x="7631356" y="12977620"/>
+            <a:chExt cx="4557273" cy="1027411"/>
+          </a:xfrm>
+        </p:grpSpPr>
+        <p:sp>
+          <p:nvSpPr>
+            <p:cNvPr id="164" name="Retângulo: Cantos Arredondados 163">
+              <a:extLst>
+                <a:ext uri="{FF2B5EF4-FFF2-40B4-BE49-F238E27FC236}">
+                  <a16:creationId xmlns:a16="http://schemas.microsoft.com/office/drawing/2014/main" id="{E2E67F34-3487-9D3C-241F-0C78A967F15A}"/>
+                </a:ext>
+              </a:extLst>
+            </p:cNvPr>
+            <p:cNvSpPr/>
+            <p:nvPr/>
+          </p:nvSpPr>
+          <p:spPr>
+            <a:xfrm>
+              <a:off x="7631356" y="12977620"/>
+              <a:ext cx="4557273" cy="1027411"/>
+            </a:xfrm>
+            <a:prstGeom prst="roundRect">
+              <a:avLst>
+                <a:gd name="adj" fmla="val 16306"/>
+              </a:avLst>
+            </a:prstGeom>
+            <a:solidFill>
+              <a:schemeClr val="bg1"/>
+            </a:solidFill>
+            <a:ln>
+              <a:noFill/>
+            </a:ln>
+            <a:effectLst>
+              <a:glow rad="63500">
+                <a:schemeClr val="bg1">
+                  <a:lumMod val="75000"/>
+                  <a:alpha val="40000"/>
+                </a:schemeClr>
+              </a:glow>
+              <a:outerShdw blurRad="50800" dist="38100" dir="5400000" algn="t" rotWithShape="0">
+                <a:schemeClr val="tx1">
+                  <a:alpha val="40000"/>
+                </a:schemeClr>
+              </a:outerShdw>
+            </a:effectLst>
+          </p:spPr>
+          <p:style>
+            <a:lnRef idx="2">
+              <a:schemeClr val="accent1">
+                <a:shade val="50000"/>
+              </a:schemeClr>
+            </a:lnRef>
+            <a:fillRef idx="1">
+              <a:schemeClr val="accent1"/>
+            </a:fillRef>
+            <a:effectRef idx="0">
+              <a:schemeClr val="accent1"/>
+            </a:effectRef>
+            <a:fontRef idx="minor">
+              <a:schemeClr val="lt1"/>
+            </a:fontRef>
+          </p:style>
+          <p:txBody>
+            <a:bodyPr rtlCol="0" anchor="ctr"/>
+            <a:lstStyle/>
+            <a:p>
+              <a:pPr algn="ctr"/>
+              <a:endParaRPr lang="pt-BR" sz="1265"/>
+            </a:p>
+          </p:txBody>
+        </p:sp>
+        <p:sp>
+          <p:nvSpPr>
+            <p:cNvPr id="30" name="CaixaDeTexto 29">
+              <a:extLst>
+                <a:ext uri="{FF2B5EF4-FFF2-40B4-BE49-F238E27FC236}">
+                  <a16:creationId xmlns:a16="http://schemas.microsoft.com/office/drawing/2014/main" id="{4CBE8409-62CE-BD08-5DB5-E523D8D477BD}"/>
+                </a:ext>
+              </a:extLst>
+            </p:cNvPr>
+            <p:cNvSpPr txBox="1"/>
+            <p:nvPr/>
+          </p:nvSpPr>
+          <p:spPr>
+            <a:xfrm>
+              <a:off x="7631356" y="13198938"/>
+              <a:ext cx="3410714" cy="584775"/>
+            </a:xfrm>
+            <a:prstGeom prst="rect">
+              <a:avLst/>
+            </a:prstGeom>
+            <a:noFill/>
+          </p:spPr>
+          <p:txBody>
+            <a:bodyPr wrap="square" rtlCol="0">
+              <a:spAutoFit/>
+            </a:bodyPr>
+            <a:lstStyle/>
+            <a:p>
+              <a:r>
+                <a:rPr lang="pt-BR" sz="3200" b="1" dirty="0">
+                  <a:latin typeface="Segoe UI" panose="020B0502040204020203" pitchFamily="34" charset="0"/>
+                  <a:cs typeface="Segoe UI" panose="020B0502040204020203" pitchFamily="34" charset="0"/>
+                </a:rPr>
+                <a:t>LOGISTICA</a:t>
+              </a:r>
             </a:p>
           </p:txBody>
         </p:sp>

</xml_diff>

<commit_message>
Adicionado novo gráfico de colaboradores por setor-departamento. Tratado erros de campos nulos no BancoHoras. Remodelado layout da página de Colaboradores
</commit_message>
<xml_diff>
--- a/Background/Background base.pptx
+++ b/Background/Background base.pptx
@@ -3718,7 +3718,7 @@
           <a:p>
             <a:fld id="{FE999017-FBFC-4239-B8D2-FB352F1B889A}" type="datetimeFigureOut">
               <a:rPr lang="pt-BR" smtClean="0"/>
-              <a:t>04/09/2025</a:t>
+              <a:t>08/09/2025</a:t>
             </a:fld>
             <a:endParaRPr lang="pt-BR"/>
           </a:p>
@@ -4116,7 +4116,7 @@
           <a:p>
             <a:fld id="{CF62B505-841C-4C89-B392-8F545B9B6E7F}" type="datetimeFigureOut">
               <a:rPr lang="pt-BR" smtClean="0"/>
-              <a:t>04/09/2025</a:t>
+              <a:t>08/09/2025</a:t>
             </a:fld>
             <a:endParaRPr lang="pt-BR"/>
           </a:p>
@@ -4286,7 +4286,7 @@
           <a:p>
             <a:fld id="{CF62B505-841C-4C89-B392-8F545B9B6E7F}" type="datetimeFigureOut">
               <a:rPr lang="pt-BR" smtClean="0"/>
-              <a:t>04/09/2025</a:t>
+              <a:t>08/09/2025</a:t>
             </a:fld>
             <a:endParaRPr lang="pt-BR"/>
           </a:p>
@@ -4466,7 +4466,7 @@
           <a:p>
             <a:fld id="{CF62B505-841C-4C89-B392-8F545B9B6E7F}" type="datetimeFigureOut">
               <a:rPr lang="pt-BR" smtClean="0"/>
-              <a:t>04/09/2025</a:t>
+              <a:t>08/09/2025</a:t>
             </a:fld>
             <a:endParaRPr lang="pt-BR"/>
           </a:p>
@@ -4636,7 +4636,7 @@
           <a:p>
             <a:fld id="{CF62B505-841C-4C89-B392-8F545B9B6E7F}" type="datetimeFigureOut">
               <a:rPr lang="pt-BR" smtClean="0"/>
-              <a:t>04/09/2025</a:t>
+              <a:t>08/09/2025</a:t>
             </a:fld>
             <a:endParaRPr lang="pt-BR"/>
           </a:p>
@@ -4882,7 +4882,7 @@
           <a:p>
             <a:fld id="{CF62B505-841C-4C89-B392-8F545B9B6E7F}" type="datetimeFigureOut">
               <a:rPr lang="pt-BR" smtClean="0"/>
-              <a:t>04/09/2025</a:t>
+              <a:t>08/09/2025</a:t>
             </a:fld>
             <a:endParaRPr lang="pt-BR"/>
           </a:p>
@@ -5114,7 +5114,7 @@
           <a:p>
             <a:fld id="{CF62B505-841C-4C89-B392-8F545B9B6E7F}" type="datetimeFigureOut">
               <a:rPr lang="pt-BR" smtClean="0"/>
-              <a:t>04/09/2025</a:t>
+              <a:t>08/09/2025</a:t>
             </a:fld>
             <a:endParaRPr lang="pt-BR"/>
           </a:p>
@@ -5481,7 +5481,7 @@
           <a:p>
             <a:fld id="{CF62B505-841C-4C89-B392-8F545B9B6E7F}" type="datetimeFigureOut">
               <a:rPr lang="pt-BR" smtClean="0"/>
-              <a:t>04/09/2025</a:t>
+              <a:t>08/09/2025</a:t>
             </a:fld>
             <a:endParaRPr lang="pt-BR"/>
           </a:p>
@@ -5599,7 +5599,7 @@
           <a:p>
             <a:fld id="{CF62B505-841C-4C89-B392-8F545B9B6E7F}" type="datetimeFigureOut">
               <a:rPr lang="pt-BR" smtClean="0"/>
-              <a:t>04/09/2025</a:t>
+              <a:t>08/09/2025</a:t>
             </a:fld>
             <a:endParaRPr lang="pt-BR"/>
           </a:p>
@@ -5694,7 +5694,7 @@
           <a:p>
             <a:fld id="{CF62B505-841C-4C89-B392-8F545B9B6E7F}" type="datetimeFigureOut">
               <a:rPr lang="pt-BR" smtClean="0"/>
-              <a:t>04/09/2025</a:t>
+              <a:t>08/09/2025</a:t>
             </a:fld>
             <a:endParaRPr lang="pt-BR"/>
           </a:p>
@@ -5971,7 +5971,7 @@
           <a:p>
             <a:fld id="{CF62B505-841C-4C89-B392-8F545B9B6E7F}" type="datetimeFigureOut">
               <a:rPr lang="pt-BR" smtClean="0"/>
-              <a:t>04/09/2025</a:t>
+              <a:t>08/09/2025</a:t>
             </a:fld>
             <a:endParaRPr lang="pt-BR"/>
           </a:p>
@@ -6228,7 +6228,7 @@
           <a:p>
             <a:fld id="{CF62B505-841C-4C89-B392-8F545B9B6E7F}" type="datetimeFigureOut">
               <a:rPr lang="pt-BR" smtClean="0"/>
-              <a:t>04/09/2025</a:t>
+              <a:t>08/09/2025</a:t>
             </a:fld>
             <a:endParaRPr lang="pt-BR"/>
           </a:p>
@@ -6441,7 +6441,7 @@
           <a:p>
             <a:fld id="{CF62B505-841C-4C89-B392-8F545B9B6E7F}" type="datetimeFigureOut">
               <a:rPr lang="pt-BR" smtClean="0"/>
-              <a:t>04/09/2025</a:t>
+              <a:t>08/09/2025</a:t>
             </a:fld>
             <a:endParaRPr lang="pt-BR"/>
           </a:p>
@@ -11557,7 +11557,7 @@
         <p:spPr>
           <a:xfrm>
             <a:off x="2231440" y="2950483"/>
-            <a:ext cx="5083760" cy="10726604"/>
+            <a:ext cx="5152274" cy="6291976"/>
           </a:xfrm>
           <a:prstGeom prst="roundRect">
             <a:avLst>
@@ -11611,10 +11611,10 @@
       </p:sp>
       <p:sp>
         <p:nvSpPr>
-          <p:cNvPr id="5" name="Retângulo: Cantos Arredondados 4">
+          <p:cNvPr id="8" name="Retângulo: Cantos Arredondados 7">
             <a:extLst>
               <a:ext uri="{FF2B5EF4-FFF2-40B4-BE49-F238E27FC236}">
-                <a16:creationId xmlns:a16="http://schemas.microsoft.com/office/drawing/2014/main" id="{BAD9A8BA-7CB3-D6CF-9830-540CF943D843}"/>
+                <a16:creationId xmlns:a16="http://schemas.microsoft.com/office/drawing/2014/main" id="{99839C40-A511-C6F3-D7A3-2EE38CF458C9}"/>
               </a:ext>
             </a:extLst>
           </p:cNvPr>
@@ -11623,8 +11623,8 @@
         </p:nvSpPr>
         <p:spPr>
           <a:xfrm>
-            <a:off x="16381379" y="8096689"/>
-            <a:ext cx="8699627" cy="5580399"/>
+            <a:off x="16730365" y="2950483"/>
+            <a:ext cx="8114076" cy="4643620"/>
           </a:xfrm>
           <a:prstGeom prst="roundRect">
             <a:avLst>
@@ -11678,73 +11678,6 @@
       </p:sp>
       <p:sp>
         <p:nvSpPr>
-          <p:cNvPr id="8" name="Retângulo: Cantos Arredondados 7">
-            <a:extLst>
-              <a:ext uri="{FF2B5EF4-FFF2-40B4-BE49-F238E27FC236}">
-                <a16:creationId xmlns:a16="http://schemas.microsoft.com/office/drawing/2014/main" id="{99839C40-A511-C6F3-D7A3-2EE38CF458C9}"/>
-              </a:ext>
-            </a:extLst>
-          </p:cNvPr>
-          <p:cNvSpPr/>
-          <p:nvPr/>
-        </p:nvSpPr>
-        <p:spPr>
-          <a:xfrm>
-            <a:off x="7597865" y="2950482"/>
-            <a:ext cx="17246578" cy="4812327"/>
-          </a:xfrm>
-          <a:prstGeom prst="roundRect">
-            <a:avLst>
-              <a:gd name="adj" fmla="val 5591"/>
-            </a:avLst>
-          </a:prstGeom>
-          <a:solidFill>
-            <a:schemeClr val="bg1"/>
-          </a:solidFill>
-          <a:ln>
-            <a:noFill/>
-          </a:ln>
-          <a:effectLst>
-            <a:glow rad="63500">
-              <a:schemeClr val="bg1">
-                <a:lumMod val="75000"/>
-                <a:alpha val="40000"/>
-              </a:schemeClr>
-            </a:glow>
-            <a:outerShdw blurRad="50800" dist="38100" dir="5400000" algn="t" rotWithShape="0">
-              <a:schemeClr val="tx1">
-                <a:alpha val="40000"/>
-              </a:schemeClr>
-            </a:outerShdw>
-          </a:effectLst>
-        </p:spPr>
-        <p:style>
-          <a:lnRef idx="2">
-            <a:schemeClr val="accent1">
-              <a:shade val="50000"/>
-            </a:schemeClr>
-          </a:lnRef>
-          <a:fillRef idx="1">
-            <a:schemeClr val="accent1"/>
-          </a:fillRef>
-          <a:effectRef idx="0">
-            <a:schemeClr val="accent1"/>
-          </a:effectRef>
-          <a:fontRef idx="minor">
-            <a:schemeClr val="lt1"/>
-          </a:fontRef>
-        </p:style>
-        <p:txBody>
-          <a:bodyPr rtlCol="0" anchor="ctr"/>
-          <a:lstStyle/>
-          <a:p>
-            <a:pPr algn="ctr"/>
-            <a:endParaRPr lang="pt-BR" sz="1265"/>
-          </a:p>
-        </p:txBody>
-      </p:sp>
-      <p:sp>
-        <p:nvSpPr>
           <p:cNvPr id="9" name="Retângulo: Cantos Arredondados 8">
             <a:extLst>
               <a:ext uri="{FF2B5EF4-FFF2-40B4-BE49-F238E27FC236}">
@@ -11757,8 +11690,8 @@
         </p:nvSpPr>
         <p:spPr>
           <a:xfrm>
-            <a:off x="7597865" y="8096688"/>
-            <a:ext cx="8521218" cy="5580399"/>
+            <a:off x="7904018" y="7983349"/>
+            <a:ext cx="16940425" cy="5693738"/>
           </a:xfrm>
           <a:prstGeom prst="roundRect">
             <a:avLst>
@@ -11930,8 +11863,8 @@
         </p:nvGrpSpPr>
         <p:grpSpPr>
           <a:xfrm>
-            <a:off x="2227660" y="1480454"/>
-            <a:ext cx="1916323" cy="1143558"/>
+            <a:off x="4681663" y="1484558"/>
+            <a:ext cx="1589112" cy="1143558"/>
             <a:chOff x="2227660" y="1471791"/>
             <a:chExt cx="2752902" cy="1143558"/>
           </a:xfrm>
@@ -12056,7 +11989,7 @@
         </p:nvGrpSpPr>
         <p:grpSpPr>
           <a:xfrm>
-            <a:off x="4433599" y="1480454"/>
+            <a:off x="6619543" y="1484558"/>
             <a:ext cx="2660499" cy="1143559"/>
             <a:chOff x="5559857" y="1471789"/>
             <a:chExt cx="3851803" cy="1143559"/>
@@ -12182,8 +12115,8 @@
         </p:nvGrpSpPr>
         <p:grpSpPr>
           <a:xfrm>
-            <a:off x="14328885" y="1471789"/>
-            <a:ext cx="6402307" cy="1160889"/>
+            <a:off x="16073640" y="1475893"/>
+            <a:ext cx="5716317" cy="1160889"/>
             <a:chOff x="9990954" y="1471790"/>
             <a:chExt cx="6402307" cy="1143558"/>
           </a:xfrm>
@@ -12308,8 +12241,8 @@
         </p:nvGrpSpPr>
         <p:grpSpPr>
           <a:xfrm>
-            <a:off x="7383714" y="1480454"/>
-            <a:ext cx="2727796" cy="1143558"/>
+            <a:off x="9628810" y="1484558"/>
+            <a:ext cx="2109150" cy="1143558"/>
             <a:chOff x="9990954" y="1471790"/>
             <a:chExt cx="6402307" cy="1143558"/>
           </a:xfrm>
@@ -12434,7 +12367,7 @@
         </p:nvGrpSpPr>
         <p:grpSpPr>
           <a:xfrm>
-            <a:off x="10401126" y="1480454"/>
+            <a:off x="12086728" y="1484558"/>
             <a:ext cx="3638144" cy="1143558"/>
             <a:chOff x="9990954" y="1471790"/>
             <a:chExt cx="6402307" cy="1143558"/>
@@ -12541,6 +12474,266 @@
                   <a:latin typeface="Montserrat SemiBold" panose="00000700000000000000" pitchFamily="2" charset="0"/>
                 </a:rPr>
                 <a:t>SETOR/DEPARTAMENTO</a:t>
+              </a:r>
+            </a:p>
+          </p:txBody>
+        </p:sp>
+      </p:grpSp>
+      <p:sp>
+        <p:nvSpPr>
+          <p:cNvPr id="29" name="Retângulo: Cantos Arredondados 28">
+            <a:extLst>
+              <a:ext uri="{FF2B5EF4-FFF2-40B4-BE49-F238E27FC236}">
+                <a16:creationId xmlns:a16="http://schemas.microsoft.com/office/drawing/2014/main" id="{3AAF3F90-0CEC-4BDD-D04F-1326C4F90E67}"/>
+              </a:ext>
+            </a:extLst>
+          </p:cNvPr>
+          <p:cNvSpPr/>
+          <p:nvPr/>
+        </p:nvSpPr>
+        <p:spPr>
+          <a:xfrm>
+            <a:off x="2227660" y="9592415"/>
+            <a:ext cx="5152274" cy="4068597"/>
+          </a:xfrm>
+          <a:prstGeom prst="roundRect">
+            <a:avLst>
+              <a:gd name="adj" fmla="val 5591"/>
+            </a:avLst>
+          </a:prstGeom>
+          <a:solidFill>
+            <a:schemeClr val="bg1"/>
+          </a:solidFill>
+          <a:ln>
+            <a:noFill/>
+          </a:ln>
+          <a:effectLst>
+            <a:glow rad="63500">
+              <a:schemeClr val="bg1">
+                <a:lumMod val="75000"/>
+                <a:alpha val="40000"/>
+              </a:schemeClr>
+            </a:glow>
+            <a:outerShdw blurRad="50800" dist="38100" dir="5400000" algn="t" rotWithShape="0">
+              <a:schemeClr val="tx1">
+                <a:alpha val="40000"/>
+              </a:schemeClr>
+            </a:outerShdw>
+          </a:effectLst>
+        </p:spPr>
+        <p:style>
+          <a:lnRef idx="2">
+            <a:schemeClr val="accent1">
+              <a:shade val="50000"/>
+            </a:schemeClr>
+          </a:lnRef>
+          <a:fillRef idx="1">
+            <a:schemeClr val="accent1"/>
+          </a:fillRef>
+          <a:effectRef idx="0">
+            <a:schemeClr val="accent1"/>
+          </a:effectRef>
+          <a:fontRef idx="minor">
+            <a:schemeClr val="lt1"/>
+          </a:fontRef>
+        </p:style>
+        <p:txBody>
+          <a:bodyPr rtlCol="0" anchor="ctr"/>
+          <a:lstStyle/>
+          <a:p>
+            <a:pPr algn="ctr"/>
+            <a:endParaRPr lang="pt-BR" sz="1265"/>
+          </a:p>
+        </p:txBody>
+      </p:sp>
+      <p:sp>
+        <p:nvSpPr>
+          <p:cNvPr id="30" name="Retângulo: Cantos Arredondados 29">
+            <a:extLst>
+              <a:ext uri="{FF2B5EF4-FFF2-40B4-BE49-F238E27FC236}">
+                <a16:creationId xmlns:a16="http://schemas.microsoft.com/office/drawing/2014/main" id="{853A13AE-7F32-D4BB-3398-58111C282201}"/>
+              </a:ext>
+            </a:extLst>
+          </p:cNvPr>
+          <p:cNvSpPr/>
+          <p:nvPr/>
+        </p:nvSpPr>
+        <p:spPr>
+          <a:xfrm>
+            <a:off x="7907798" y="2950480"/>
+            <a:ext cx="8329279" cy="4643623"/>
+          </a:xfrm>
+          <a:prstGeom prst="roundRect">
+            <a:avLst>
+              <a:gd name="adj" fmla="val 5591"/>
+            </a:avLst>
+          </a:prstGeom>
+          <a:solidFill>
+            <a:schemeClr val="bg1"/>
+          </a:solidFill>
+          <a:ln>
+            <a:noFill/>
+          </a:ln>
+          <a:effectLst>
+            <a:glow rad="63500">
+              <a:schemeClr val="bg1">
+                <a:lumMod val="75000"/>
+                <a:alpha val="40000"/>
+              </a:schemeClr>
+            </a:glow>
+            <a:outerShdw blurRad="50800" dist="38100" dir="5400000" algn="t" rotWithShape="0">
+              <a:schemeClr val="tx1">
+                <a:alpha val="40000"/>
+              </a:schemeClr>
+            </a:outerShdw>
+          </a:effectLst>
+        </p:spPr>
+        <p:style>
+          <a:lnRef idx="2">
+            <a:schemeClr val="accent1">
+              <a:shade val="50000"/>
+            </a:schemeClr>
+          </a:lnRef>
+          <a:fillRef idx="1">
+            <a:schemeClr val="accent1"/>
+          </a:fillRef>
+          <a:effectRef idx="0">
+            <a:schemeClr val="accent1"/>
+          </a:effectRef>
+          <a:fontRef idx="minor">
+            <a:schemeClr val="lt1"/>
+          </a:fontRef>
+        </p:style>
+        <p:txBody>
+          <a:bodyPr rtlCol="0" anchor="ctr"/>
+          <a:lstStyle/>
+          <a:p>
+            <a:pPr algn="ctr"/>
+            <a:endParaRPr lang="pt-BR" sz="1265"/>
+          </a:p>
+        </p:txBody>
+      </p:sp>
+      <p:grpSp>
+        <p:nvGrpSpPr>
+          <p:cNvPr id="31" name="Agrupar 30">
+            <a:extLst>
+              <a:ext uri="{FF2B5EF4-FFF2-40B4-BE49-F238E27FC236}">
+                <a16:creationId xmlns:a16="http://schemas.microsoft.com/office/drawing/2014/main" id="{3B3CD0E0-1BCB-1B6C-06DE-D56F8F483A43}"/>
+              </a:ext>
+            </a:extLst>
+          </p:cNvPr>
+          <p:cNvGrpSpPr/>
+          <p:nvPr/>
+        </p:nvGrpSpPr>
+        <p:grpSpPr>
+          <a:xfrm>
+            <a:off x="2227660" y="1484558"/>
+            <a:ext cx="2105235" cy="1143558"/>
+            <a:chOff x="2227660" y="1471791"/>
+            <a:chExt cx="2752902" cy="1143558"/>
+          </a:xfrm>
+        </p:grpSpPr>
+        <p:sp>
+          <p:nvSpPr>
+            <p:cNvPr id="32" name="Retângulo: Cantos Arredondados 31">
+              <a:extLst>
+                <a:ext uri="{FF2B5EF4-FFF2-40B4-BE49-F238E27FC236}">
+                  <a16:creationId xmlns:a16="http://schemas.microsoft.com/office/drawing/2014/main" id="{52CDAC8F-F2DE-2F8C-F792-15660414A04B}"/>
+                </a:ext>
+              </a:extLst>
+            </p:cNvPr>
+            <p:cNvSpPr/>
+            <p:nvPr/>
+          </p:nvSpPr>
+          <p:spPr>
+            <a:xfrm>
+              <a:off x="2231440" y="1471791"/>
+              <a:ext cx="2749122" cy="1143558"/>
+            </a:xfrm>
+            <a:prstGeom prst="roundRect">
+              <a:avLst>
+                <a:gd name="adj" fmla="val 16306"/>
+              </a:avLst>
+            </a:prstGeom>
+            <a:solidFill>
+              <a:schemeClr val="bg1"/>
+            </a:solidFill>
+            <a:ln>
+              <a:noFill/>
+            </a:ln>
+            <a:effectLst>
+              <a:glow rad="63500">
+                <a:schemeClr val="bg1">
+                  <a:lumMod val="75000"/>
+                  <a:alpha val="40000"/>
+                </a:schemeClr>
+              </a:glow>
+              <a:outerShdw blurRad="50800" dist="38100" dir="5400000" algn="t" rotWithShape="0">
+                <a:schemeClr val="tx1">
+                  <a:alpha val="40000"/>
+                </a:schemeClr>
+              </a:outerShdw>
+            </a:effectLst>
+          </p:spPr>
+          <p:style>
+            <a:lnRef idx="2">
+              <a:schemeClr val="accent1">
+                <a:shade val="50000"/>
+              </a:schemeClr>
+            </a:lnRef>
+            <a:fillRef idx="1">
+              <a:schemeClr val="accent1"/>
+            </a:fillRef>
+            <a:effectRef idx="0">
+              <a:schemeClr val="accent1"/>
+            </a:effectRef>
+            <a:fontRef idx="minor">
+              <a:schemeClr val="lt1"/>
+            </a:fontRef>
+          </p:style>
+          <p:txBody>
+            <a:bodyPr rtlCol="0" anchor="ctr"/>
+            <a:lstStyle/>
+            <a:p>
+              <a:pPr algn="ctr"/>
+              <a:endParaRPr lang="pt-BR" sz="1265"/>
+            </a:p>
+          </p:txBody>
+        </p:sp>
+        <p:sp>
+          <p:nvSpPr>
+            <p:cNvPr id="33" name="CaixaDeTexto 32">
+              <a:extLst>
+                <a:ext uri="{FF2B5EF4-FFF2-40B4-BE49-F238E27FC236}">
+                  <a16:creationId xmlns:a16="http://schemas.microsoft.com/office/drawing/2014/main" id="{F6228A0E-5A68-6A03-4836-D13EED420AEA}"/>
+                </a:ext>
+              </a:extLst>
+            </p:cNvPr>
+            <p:cNvSpPr txBox="1"/>
+            <p:nvPr/>
+          </p:nvSpPr>
+          <p:spPr>
+            <a:xfrm>
+              <a:off x="2227660" y="1496945"/>
+              <a:ext cx="2749122" cy="369332"/>
+            </a:xfrm>
+            <a:prstGeom prst="rect">
+              <a:avLst/>
+            </a:prstGeom>
+            <a:noFill/>
+          </p:spPr>
+          <p:txBody>
+            <a:bodyPr wrap="square" rtlCol="0">
+              <a:spAutoFit/>
+            </a:bodyPr>
+            <a:lstStyle/>
+            <a:p>
+              <a:pPr algn="ctr"/>
+              <a:r>
+                <a:rPr lang="pt-BR" dirty="0">
+                  <a:latin typeface="Montserrat SemiBold" panose="00000700000000000000" pitchFamily="2" charset="0"/>
+                </a:rPr>
+                <a:t>MÊS/ANO</a:t>
               </a:r>
             </a:p>
           </p:txBody>

</xml_diff>